<commit_message>
update N2_Resource_List_20161028.pptx update N2_Team_Char_Animation.xlsx and N2_Team_SoundList.xlsx
</commit_message>
<xml_diff>
--- a/doc/_meeting_doc/N2_Resource_List_20161028.pptx
+++ b/doc/_meeting_doc/N2_Resource_List_20161028.pptx
@@ -3223,13 +3223,8 @@
             </a:pPr>
             <a:r>
               <a:rPr lang="en-US" altLang="ko-KR" dirty="0" smtClean="0"/>
-              <a:t>Animation Character </a:t>
-            </a:r>
-            <a:r>
-              <a:rPr lang="en-US" altLang="ko-KR" dirty="0" smtClean="0"/>
-              <a:t>Zombie</a:t>
-            </a:r>
-            <a:endParaRPr lang="en-US" altLang="ko-KR" dirty="0" smtClean="0"/>
+              <a:t>Animation Character Zombie</a:t>
+            </a:r>
           </a:p>
           <a:p>
             <a:pPr marL="342900" indent="-342900">
@@ -3240,7 +3235,6 @@
               <a:rPr lang="en-US" altLang="ko-KR" dirty="0" smtClean="0"/>
               <a:t>Object</a:t>
             </a:r>
-            <a:endParaRPr lang="en-US" altLang="ko-KR" dirty="0" smtClean="0"/>
           </a:p>
           <a:p>
             <a:pPr marL="342900" indent="-342900">
@@ -3249,17 +3243,8 @@
             </a:pPr>
             <a:r>
               <a:rPr lang="en-US" altLang="ko-KR" dirty="0" smtClean="0"/>
-              <a:t>Effect </a:t>
-            </a:r>
-            <a:r>
-              <a:rPr lang="en-US" altLang="ko-KR" dirty="0" smtClean="0"/>
-              <a:t>Object &amp; </a:t>
-            </a:r>
-            <a:r>
-              <a:rPr lang="en-US" altLang="ko-KR" dirty="0" smtClean="0"/>
-              <a:t>Item</a:t>
-            </a:r>
-            <a:endParaRPr lang="en-US" altLang="ko-KR" dirty="0" smtClean="0"/>
+              <a:t>Effect Object &amp; Item</a:t>
+            </a:r>
           </a:p>
         </p:txBody>
       </p:sp>
@@ -3318,7 +3303,7 @@
       </p:sp>
       <p:pic>
         <p:nvPicPr>
-          <p:cNvPr id="6146" name="Picture 2"/>
+          <p:cNvPr id="2050" name="Picture 2"/>
           <p:cNvPicPr>
             <a:picLocks noGrp="1" noChangeAspect="1" noChangeArrowheads="1"/>
           </p:cNvPicPr>
@@ -3335,8 +3320,8 @@
         </p:blipFill>
         <p:spPr bwMode="auto">
           <a:xfrm>
-            <a:off x="1331640" y="1124744"/>
-            <a:ext cx="6353226" cy="5222717"/>
+            <a:off x="81699" y="980728"/>
+            <a:ext cx="8954797" cy="5145435"/>
           </a:xfrm>
           <a:prstGeom prst="rect">
             <a:avLst/>
@@ -3385,7 +3370,12 @@
             <p:ph type="title"/>
           </p:nvPr>
         </p:nvSpPr>
-        <p:spPr/>
+        <p:spPr>
+          <a:xfrm>
+            <a:off x="467544" y="0"/>
+            <a:ext cx="8229600" cy="1143000"/>
+          </a:xfrm>
+        </p:spPr>
         <p:txBody>
           <a:bodyPr/>
           <a:lstStyle/>
@@ -3400,13 +3390,11 @@
       </p:sp>
       <p:pic>
         <p:nvPicPr>
-          <p:cNvPr id="1026" name="Picture 2"/>
+          <p:cNvPr id="3" name="Picture 2"/>
           <p:cNvPicPr>
-            <a:picLocks noGrp="1" noChangeAspect="1" noChangeArrowheads="1"/>
+            <a:picLocks noChangeAspect="1" noChangeArrowheads="1"/>
           </p:cNvPicPr>
-          <p:nvPr>
-            <p:ph idx="1"/>
-          </p:nvPr>
+          <p:nvPr/>
         </p:nvPicPr>
         <p:blipFill>
           <a:blip r:embed="rId2" cstate="print"/>
@@ -3417,8 +3405,8 @@
         </p:blipFill>
         <p:spPr bwMode="auto">
           <a:xfrm>
-            <a:off x="504825" y="2001044"/>
-            <a:ext cx="8134350" cy="3724275"/>
+            <a:off x="683568" y="1052736"/>
+            <a:ext cx="7822679" cy="5137088"/>
           </a:xfrm>
           <a:prstGeom prst="rect">
             <a:avLst/>
@@ -3986,15 +3974,7 @@
           <a:p>
             <a:r>
               <a:rPr lang="en-US" altLang="ko-KR" dirty="0" smtClean="0"/>
-              <a:t>5.Effect </a:t>
-            </a:r>
-            <a:r>
-              <a:rPr lang="en-US" altLang="ko-KR" dirty="0" smtClean="0"/>
-              <a:t>Object &amp; </a:t>
-            </a:r>
-            <a:r>
-              <a:rPr lang="en-US" altLang="ko-KR" dirty="0" smtClean="0"/>
-              <a:t>Item</a:t>
+              <a:t>5.Effect Object &amp; Item</a:t>
             </a:r>
             <a:endParaRPr lang="ko-KR" altLang="en-US" dirty="0"/>
           </a:p>

</xml_diff>

<commit_message>
[doc] update N2_Resource_List_20161028.pptx N2_Team_Char_Animation.odp and add N2_Team_Game_Design_20170111.pptx
</commit_message>
<xml_diff>
--- a/doc/_meeting_doc/N2_Resource_List_20161028.pptx
+++ b/doc/_meeting_doc/N2_Resource_List_20161028.pptx
@@ -4,15 +4,25 @@
   <p:sldMasterIdLst>
     <p:sldMasterId id="2147483648" r:id="rId1"/>
   </p:sldMasterIdLst>
+  <p:notesMasterIdLst>
+    <p:notesMasterId r:id="rId17"/>
+  </p:notesMasterIdLst>
   <p:sldIdLst>
     <p:sldId id="256" r:id="rId2"/>
     <p:sldId id="262" r:id="rId3"/>
     <p:sldId id="257" r:id="rId4"/>
-    <p:sldId id="261" r:id="rId5"/>
-    <p:sldId id="258" r:id="rId6"/>
-    <p:sldId id="263" r:id="rId7"/>
-    <p:sldId id="264" r:id="rId8"/>
-    <p:sldId id="260" r:id="rId9"/>
+    <p:sldId id="265" r:id="rId5"/>
+    <p:sldId id="266" r:id="rId6"/>
+    <p:sldId id="267" r:id="rId7"/>
+    <p:sldId id="268" r:id="rId8"/>
+    <p:sldId id="269" r:id="rId9"/>
+    <p:sldId id="270" r:id="rId10"/>
+    <p:sldId id="271" r:id="rId11"/>
+    <p:sldId id="272" r:id="rId12"/>
+    <p:sldId id="258" r:id="rId13"/>
+    <p:sldId id="263" r:id="rId14"/>
+    <p:sldId id="264" r:id="rId15"/>
+    <p:sldId id="260" r:id="rId16"/>
   </p:sldIdLst>
   <p:sldSz cx="9144000" cy="6858000" type="screen4x3"/>
   <p:notesSz cx="6858000" cy="9144000"/>
@@ -114,6 +124,1337 @@
 </p:presentation>
 </file>
 
+<file path=ppt/notesMasters/notesMaster1.xml><?xml version="1.0" encoding="utf-8"?>
+<p:notesMaster xmlns:a="http://schemas.openxmlformats.org/drawingml/2006/main" xmlns:r="http://schemas.openxmlformats.org/officeDocument/2006/relationships" xmlns:p="http://schemas.openxmlformats.org/presentationml/2006/main">
+  <p:cSld>
+    <p:bg>
+      <p:bgRef idx="1001">
+        <a:schemeClr val="bg1"/>
+      </p:bgRef>
+    </p:bg>
+    <p:spTree>
+      <p:nvGrpSpPr>
+        <p:cNvPr id="1" name=""/>
+        <p:cNvGrpSpPr/>
+        <p:nvPr/>
+      </p:nvGrpSpPr>
+      <p:grpSpPr>
+        <a:xfrm>
+          <a:off x="0" y="0"/>
+          <a:ext cx="0" cy="0"/>
+          <a:chOff x="0" y="0"/>
+          <a:chExt cx="0" cy="0"/>
+        </a:xfrm>
+      </p:grpSpPr>
+      <p:sp>
+        <p:nvSpPr>
+          <p:cNvPr id="2" name="머리글 개체 틀 1"/>
+          <p:cNvSpPr>
+            <a:spLocks noGrp="1"/>
+          </p:cNvSpPr>
+          <p:nvPr>
+            <p:ph type="hdr" sz="quarter"/>
+          </p:nvPr>
+        </p:nvSpPr>
+        <p:spPr>
+          <a:xfrm>
+            <a:off x="0" y="0"/>
+            <a:ext cx="2971800" cy="457200"/>
+          </a:xfrm>
+          <a:prstGeom prst="rect">
+            <a:avLst/>
+          </a:prstGeom>
+        </p:spPr>
+        <p:txBody>
+          <a:bodyPr vert="horz" lIns="91440" tIns="45720" rIns="91440" bIns="45720" rtlCol="0"/>
+          <a:lstStyle>
+            <a:lvl1pPr algn="l">
+              <a:defRPr sz="1200"/>
+            </a:lvl1pPr>
+          </a:lstStyle>
+          <a:p>
+            <a:endParaRPr lang="ko-KR" altLang="en-US"/>
+          </a:p>
+        </p:txBody>
+      </p:sp>
+      <p:sp>
+        <p:nvSpPr>
+          <p:cNvPr id="3" name="날짜 개체 틀 2"/>
+          <p:cNvSpPr>
+            <a:spLocks noGrp="1"/>
+          </p:cNvSpPr>
+          <p:nvPr>
+            <p:ph type="dt" idx="1"/>
+          </p:nvPr>
+        </p:nvSpPr>
+        <p:spPr>
+          <a:xfrm>
+            <a:off x="3884613" y="0"/>
+            <a:ext cx="2971800" cy="457200"/>
+          </a:xfrm>
+          <a:prstGeom prst="rect">
+            <a:avLst/>
+          </a:prstGeom>
+        </p:spPr>
+        <p:txBody>
+          <a:bodyPr vert="horz" lIns="91440" tIns="45720" rIns="91440" bIns="45720" rtlCol="0"/>
+          <a:lstStyle>
+            <a:lvl1pPr algn="r">
+              <a:defRPr sz="1200"/>
+            </a:lvl1pPr>
+          </a:lstStyle>
+          <a:p>
+            <a:fld id="{0CCC2CCF-A878-42E6-91F3-D89DC8CAD7F4}" type="datetimeFigureOut">
+              <a:rPr lang="ko-KR" altLang="en-US" smtClean="0"/>
+              <a:t>2017-01-11</a:t>
+            </a:fld>
+            <a:endParaRPr lang="ko-KR" altLang="en-US"/>
+          </a:p>
+        </p:txBody>
+      </p:sp>
+      <p:sp>
+        <p:nvSpPr>
+          <p:cNvPr id="4" name="슬라이드 이미지 개체 틀 3"/>
+          <p:cNvSpPr>
+            <a:spLocks noGrp="1" noRot="1" noChangeAspect="1"/>
+          </p:cNvSpPr>
+          <p:nvPr>
+            <p:ph type="sldImg" idx="2"/>
+          </p:nvPr>
+        </p:nvSpPr>
+        <p:spPr>
+          <a:xfrm>
+            <a:off x="1143000" y="685800"/>
+            <a:ext cx="4572000" cy="3429000"/>
+          </a:xfrm>
+          <a:prstGeom prst="rect">
+            <a:avLst/>
+          </a:prstGeom>
+          <a:noFill/>
+          <a:ln w="12700">
+            <a:solidFill>
+              <a:prstClr val="black"/>
+            </a:solidFill>
+          </a:ln>
+        </p:spPr>
+        <p:txBody>
+          <a:bodyPr vert="horz" lIns="91440" tIns="45720" rIns="91440" bIns="45720" rtlCol="0" anchor="ctr"/>
+          <a:lstStyle/>
+          <a:p>
+            <a:endParaRPr lang="ko-KR" altLang="en-US"/>
+          </a:p>
+        </p:txBody>
+      </p:sp>
+      <p:sp>
+        <p:nvSpPr>
+          <p:cNvPr id="5" name="슬라이드 노트 개체 틀 4"/>
+          <p:cNvSpPr>
+            <a:spLocks noGrp="1"/>
+          </p:cNvSpPr>
+          <p:nvPr>
+            <p:ph type="body" sz="quarter" idx="3"/>
+          </p:nvPr>
+        </p:nvSpPr>
+        <p:spPr>
+          <a:xfrm>
+            <a:off x="685800" y="4343400"/>
+            <a:ext cx="5486400" cy="4114800"/>
+          </a:xfrm>
+          <a:prstGeom prst="rect">
+            <a:avLst/>
+          </a:prstGeom>
+        </p:spPr>
+        <p:txBody>
+          <a:bodyPr vert="horz" lIns="91440" tIns="45720" rIns="91440" bIns="45720" rtlCol="0">
+            <a:normAutofit/>
+          </a:bodyPr>
+          <a:lstStyle/>
+          <a:p>
+            <a:pPr lvl="0"/>
+            <a:r>
+              <a:rPr lang="ko-KR" altLang="en-US" smtClean="0"/>
+              <a:t>마스터 텍스트 스타일을 편집합니다</a:t>
+            </a:r>
+          </a:p>
+          <a:p>
+            <a:pPr lvl="1"/>
+            <a:r>
+              <a:rPr lang="ko-KR" altLang="en-US" smtClean="0"/>
+              <a:t>둘째 수준</a:t>
+            </a:r>
+          </a:p>
+          <a:p>
+            <a:pPr lvl="2"/>
+            <a:r>
+              <a:rPr lang="ko-KR" altLang="en-US" smtClean="0"/>
+              <a:t>셋째 수준</a:t>
+            </a:r>
+          </a:p>
+          <a:p>
+            <a:pPr lvl="3"/>
+            <a:r>
+              <a:rPr lang="ko-KR" altLang="en-US" smtClean="0"/>
+              <a:t>넷째 수준</a:t>
+            </a:r>
+          </a:p>
+          <a:p>
+            <a:pPr lvl="4"/>
+            <a:r>
+              <a:rPr lang="ko-KR" altLang="en-US" smtClean="0"/>
+              <a:t>다섯째 수준</a:t>
+            </a:r>
+            <a:endParaRPr lang="ko-KR" altLang="en-US"/>
+          </a:p>
+        </p:txBody>
+      </p:sp>
+      <p:sp>
+        <p:nvSpPr>
+          <p:cNvPr id="6" name="바닥글 개체 틀 5"/>
+          <p:cNvSpPr>
+            <a:spLocks noGrp="1"/>
+          </p:cNvSpPr>
+          <p:nvPr>
+            <p:ph type="ftr" sz="quarter" idx="4"/>
+          </p:nvPr>
+        </p:nvSpPr>
+        <p:spPr>
+          <a:xfrm>
+            <a:off x="0" y="8685213"/>
+            <a:ext cx="2971800" cy="457200"/>
+          </a:xfrm>
+          <a:prstGeom prst="rect">
+            <a:avLst/>
+          </a:prstGeom>
+        </p:spPr>
+        <p:txBody>
+          <a:bodyPr vert="horz" lIns="91440" tIns="45720" rIns="91440" bIns="45720" rtlCol="0" anchor="b"/>
+          <a:lstStyle>
+            <a:lvl1pPr algn="l">
+              <a:defRPr sz="1200"/>
+            </a:lvl1pPr>
+          </a:lstStyle>
+          <a:p>
+            <a:endParaRPr lang="ko-KR" altLang="en-US"/>
+          </a:p>
+        </p:txBody>
+      </p:sp>
+      <p:sp>
+        <p:nvSpPr>
+          <p:cNvPr id="7" name="슬라이드 번호 개체 틀 6"/>
+          <p:cNvSpPr>
+            <a:spLocks noGrp="1"/>
+          </p:cNvSpPr>
+          <p:nvPr>
+            <p:ph type="sldNum" sz="quarter" idx="5"/>
+          </p:nvPr>
+        </p:nvSpPr>
+        <p:spPr>
+          <a:xfrm>
+            <a:off x="3884613" y="8685213"/>
+            <a:ext cx="2971800" cy="457200"/>
+          </a:xfrm>
+          <a:prstGeom prst="rect">
+            <a:avLst/>
+          </a:prstGeom>
+        </p:spPr>
+        <p:txBody>
+          <a:bodyPr vert="horz" lIns="91440" tIns="45720" rIns="91440" bIns="45720" rtlCol="0" anchor="b"/>
+          <a:lstStyle>
+            <a:lvl1pPr algn="r">
+              <a:defRPr sz="1200"/>
+            </a:lvl1pPr>
+          </a:lstStyle>
+          <a:p>
+            <a:fld id="{23AA0548-2E12-46DA-BE6E-4DDBFB9AA569}" type="slidenum">
+              <a:rPr lang="ko-KR" altLang="en-US" smtClean="0"/>
+              <a:t>‹#›</a:t>
+            </a:fld>
+            <a:endParaRPr lang="ko-KR" altLang="en-US"/>
+          </a:p>
+        </p:txBody>
+      </p:sp>
+    </p:spTree>
+  </p:cSld>
+  <p:clrMap bg1="lt1" tx1="dk1" bg2="lt2" tx2="dk2" accent1="accent1" accent2="accent2" accent3="accent3" accent4="accent4" accent5="accent5" accent6="accent6" hlink="hlink" folHlink="folHlink"/>
+  <p:notesStyle>
+    <a:lvl1pPr marL="0" algn="l" defTabSz="914400" rtl="0" eaLnBrk="1" latinLnBrk="1" hangingPunct="1">
+      <a:defRPr sz="1200" kern="1200">
+        <a:solidFill>
+          <a:schemeClr val="tx1"/>
+        </a:solidFill>
+        <a:latin typeface="+mn-lt"/>
+        <a:ea typeface="+mn-ea"/>
+        <a:cs typeface="+mn-cs"/>
+      </a:defRPr>
+    </a:lvl1pPr>
+    <a:lvl2pPr marL="457200" algn="l" defTabSz="914400" rtl="0" eaLnBrk="1" latinLnBrk="1" hangingPunct="1">
+      <a:defRPr sz="1200" kern="1200">
+        <a:solidFill>
+          <a:schemeClr val="tx1"/>
+        </a:solidFill>
+        <a:latin typeface="+mn-lt"/>
+        <a:ea typeface="+mn-ea"/>
+        <a:cs typeface="+mn-cs"/>
+      </a:defRPr>
+    </a:lvl2pPr>
+    <a:lvl3pPr marL="914400" algn="l" defTabSz="914400" rtl="0" eaLnBrk="1" latinLnBrk="1" hangingPunct="1">
+      <a:defRPr sz="1200" kern="1200">
+        <a:solidFill>
+          <a:schemeClr val="tx1"/>
+        </a:solidFill>
+        <a:latin typeface="+mn-lt"/>
+        <a:ea typeface="+mn-ea"/>
+        <a:cs typeface="+mn-cs"/>
+      </a:defRPr>
+    </a:lvl3pPr>
+    <a:lvl4pPr marL="1371600" algn="l" defTabSz="914400" rtl="0" eaLnBrk="1" latinLnBrk="1" hangingPunct="1">
+      <a:defRPr sz="1200" kern="1200">
+        <a:solidFill>
+          <a:schemeClr val="tx1"/>
+        </a:solidFill>
+        <a:latin typeface="+mn-lt"/>
+        <a:ea typeface="+mn-ea"/>
+        <a:cs typeface="+mn-cs"/>
+      </a:defRPr>
+    </a:lvl4pPr>
+    <a:lvl5pPr marL="1828800" algn="l" defTabSz="914400" rtl="0" eaLnBrk="1" latinLnBrk="1" hangingPunct="1">
+      <a:defRPr sz="1200" kern="1200">
+        <a:solidFill>
+          <a:schemeClr val="tx1"/>
+        </a:solidFill>
+        <a:latin typeface="+mn-lt"/>
+        <a:ea typeface="+mn-ea"/>
+        <a:cs typeface="+mn-cs"/>
+      </a:defRPr>
+    </a:lvl5pPr>
+    <a:lvl6pPr marL="2286000" algn="l" defTabSz="914400" rtl="0" eaLnBrk="1" latinLnBrk="1" hangingPunct="1">
+      <a:defRPr sz="1200" kern="1200">
+        <a:solidFill>
+          <a:schemeClr val="tx1"/>
+        </a:solidFill>
+        <a:latin typeface="+mn-lt"/>
+        <a:ea typeface="+mn-ea"/>
+        <a:cs typeface="+mn-cs"/>
+      </a:defRPr>
+    </a:lvl6pPr>
+    <a:lvl7pPr marL="2743200" algn="l" defTabSz="914400" rtl="0" eaLnBrk="1" latinLnBrk="1" hangingPunct="1">
+      <a:defRPr sz="1200" kern="1200">
+        <a:solidFill>
+          <a:schemeClr val="tx1"/>
+        </a:solidFill>
+        <a:latin typeface="+mn-lt"/>
+        <a:ea typeface="+mn-ea"/>
+        <a:cs typeface="+mn-cs"/>
+      </a:defRPr>
+    </a:lvl7pPr>
+    <a:lvl8pPr marL="3200400" algn="l" defTabSz="914400" rtl="0" eaLnBrk="1" latinLnBrk="1" hangingPunct="1">
+      <a:defRPr sz="1200" kern="1200">
+        <a:solidFill>
+          <a:schemeClr val="tx1"/>
+        </a:solidFill>
+        <a:latin typeface="+mn-lt"/>
+        <a:ea typeface="+mn-ea"/>
+        <a:cs typeface="+mn-cs"/>
+      </a:defRPr>
+    </a:lvl8pPr>
+    <a:lvl9pPr marL="3657600" algn="l" defTabSz="914400" rtl="0" eaLnBrk="1" latinLnBrk="1" hangingPunct="1">
+      <a:defRPr sz="1200" kern="1200">
+        <a:solidFill>
+          <a:schemeClr val="tx1"/>
+        </a:solidFill>
+        <a:latin typeface="+mn-lt"/>
+        <a:ea typeface="+mn-ea"/>
+        <a:cs typeface="+mn-cs"/>
+      </a:defRPr>
+    </a:lvl9pPr>
+  </p:notesStyle>
+</p:notesMaster>
+</file>
+
+<file path=ppt/notesSlides/notesSlide1.xml><?xml version="1.0" encoding="utf-8"?>
+<p:notes xmlns:a="http://schemas.openxmlformats.org/drawingml/2006/main" xmlns:r="http://schemas.openxmlformats.org/officeDocument/2006/relationships" xmlns:p="http://schemas.openxmlformats.org/presentationml/2006/main">
+  <p:cSld>
+    <p:bg>
+      <p:bgPr>
+        <a:solidFill>
+          <a:srgbClr val="FFFFFF"/>
+        </a:solidFill>
+        <a:effectLst/>
+      </p:bgPr>
+    </p:bg>
+    <p:spTree>
+      <p:nvGrpSpPr>
+        <p:cNvPr id="1" name=""/>
+        <p:cNvGrpSpPr/>
+        <p:nvPr/>
+      </p:nvGrpSpPr>
+      <p:grpSpPr>
+        <a:xfrm>
+          <a:off x="0" y="0"/>
+          <a:ext cx="0" cy="0"/>
+          <a:chOff x="0" y="0"/>
+          <a:chExt cx="0" cy="0"/>
+        </a:xfrm>
+      </p:grpSpPr>
+      <p:sp>
+        <p:nvSpPr>
+          <p:cNvPr id="7" name="Rectangle 6"/>
+          <p:cNvSpPr>
+            <a:spLocks noGrp="1" noChangeArrowheads="1"/>
+          </p:cNvSpPr>
+          <p:nvPr>
+            <p:ph type="sldNum"/>
+          </p:nvPr>
+        </p:nvSpPr>
+        <p:spPr>
+          <a:ln/>
+        </p:spPr>
+        <p:txBody>
+          <a:bodyPr/>
+          <a:lstStyle/>
+          <a:p>
+            <a:fld id="{A5221792-428A-4F49-AB6C-EF66B92EFC29}" type="slidenum">
+              <a:rPr lang="en-US"/>
+              <a:pPr/>
+              <a:t>4</a:t>
+            </a:fld>
+            <a:endParaRPr lang="en-US"/>
+          </a:p>
+        </p:txBody>
+      </p:sp>
+      <p:sp>
+        <p:nvSpPr>
+          <p:cNvPr id="11265" name="Rectangle 1"/>
+          <p:cNvSpPr txBox="1">
+            <a:spLocks noChangeArrowheads="1"/>
+          </p:cNvSpPr>
+          <p:nvPr>
+            <p:ph type="sldImg"/>
+          </p:nvPr>
+        </p:nvSpPr>
+        <p:spPr bwMode="auto">
+          <a:xfrm>
+            <a:off x="1003786" y="695134"/>
+            <a:ext cx="4848989" cy="3428152"/>
+          </a:xfrm>
+          <a:prstGeom prst="rect">
+            <a:avLst/>
+          </a:prstGeom>
+          <a:solidFill>
+            <a:srgbClr val="FFFFFF"/>
+          </a:solidFill>
+          <a:ln>
+            <a:solidFill>
+              <a:srgbClr val="000000"/>
+            </a:solidFill>
+            <a:miter lim="800000"/>
+            <a:headEnd/>
+            <a:tailEnd/>
+          </a:ln>
+        </p:spPr>
+      </p:sp>
+      <p:sp>
+        <p:nvSpPr>
+          <p:cNvPr id="11266" name="Rectangle 2"/>
+          <p:cNvSpPr txBox="1">
+            <a:spLocks noChangeArrowheads="1"/>
+          </p:cNvSpPr>
+          <p:nvPr>
+            <p:ph type="body" idx="1"/>
+          </p:nvPr>
+        </p:nvSpPr>
+        <p:spPr bwMode="auto">
+          <a:xfrm>
+            <a:off x="685512" y="4343230"/>
+            <a:ext cx="5486976" cy="4115139"/>
+          </a:xfrm>
+          <a:prstGeom prst="rect">
+            <a:avLst/>
+          </a:prstGeom>
+          <a:noFill/>
+          <a:ln cap="flat">
+            <a:round/>
+            <a:headEnd/>
+            <a:tailEnd/>
+          </a:ln>
+        </p:spPr>
+        <p:txBody>
+          <a:bodyPr wrap="none" anchor="ctr"/>
+          <a:lstStyle/>
+          <a:p>
+            <a:endParaRPr lang="ko-KR" altLang="ko-KR"/>
+          </a:p>
+        </p:txBody>
+      </p:sp>
+    </p:spTree>
+  </p:cSld>
+  <p:clrMapOvr>
+    <a:masterClrMapping/>
+  </p:clrMapOvr>
+</p:notes>
+</file>
+
+<file path=ppt/notesSlides/notesSlide2.xml><?xml version="1.0" encoding="utf-8"?>
+<p:notes xmlns:a="http://schemas.openxmlformats.org/drawingml/2006/main" xmlns:r="http://schemas.openxmlformats.org/officeDocument/2006/relationships" xmlns:p="http://schemas.openxmlformats.org/presentationml/2006/main">
+  <p:cSld>
+    <p:bg>
+      <p:bgPr>
+        <a:solidFill>
+          <a:srgbClr val="FFFFFF"/>
+        </a:solidFill>
+        <a:effectLst/>
+      </p:bgPr>
+    </p:bg>
+    <p:spTree>
+      <p:nvGrpSpPr>
+        <p:cNvPr id="1" name=""/>
+        <p:cNvGrpSpPr/>
+        <p:nvPr/>
+      </p:nvGrpSpPr>
+      <p:grpSpPr>
+        <a:xfrm>
+          <a:off x="0" y="0"/>
+          <a:ext cx="0" cy="0"/>
+          <a:chOff x="0" y="0"/>
+          <a:chExt cx="0" cy="0"/>
+        </a:xfrm>
+      </p:grpSpPr>
+      <p:sp>
+        <p:nvSpPr>
+          <p:cNvPr id="7" name="Rectangle 6"/>
+          <p:cNvSpPr>
+            <a:spLocks noGrp="1" noChangeArrowheads="1"/>
+          </p:cNvSpPr>
+          <p:nvPr>
+            <p:ph type="sldNum"/>
+          </p:nvPr>
+        </p:nvSpPr>
+        <p:spPr>
+          <a:ln/>
+        </p:spPr>
+        <p:txBody>
+          <a:bodyPr/>
+          <a:lstStyle/>
+          <a:p>
+            <a:fld id="{C7372CD3-C206-4CEA-A6F6-5BA1CBEFC1D3}" type="slidenum">
+              <a:rPr lang="en-US"/>
+              <a:pPr/>
+              <a:t>5</a:t>
+            </a:fld>
+            <a:endParaRPr lang="en-US"/>
+          </a:p>
+        </p:txBody>
+      </p:sp>
+      <p:sp>
+        <p:nvSpPr>
+          <p:cNvPr id="12289" name="Rectangle 1"/>
+          <p:cNvSpPr txBox="1">
+            <a:spLocks noChangeArrowheads="1"/>
+          </p:cNvSpPr>
+          <p:nvPr>
+            <p:ph type="sldImg"/>
+          </p:nvPr>
+        </p:nvSpPr>
+        <p:spPr bwMode="auto">
+          <a:xfrm>
+            <a:off x="1003786" y="695134"/>
+            <a:ext cx="4848989" cy="3428152"/>
+          </a:xfrm>
+          <a:prstGeom prst="rect">
+            <a:avLst/>
+          </a:prstGeom>
+          <a:solidFill>
+            <a:srgbClr val="FFFFFF"/>
+          </a:solidFill>
+          <a:ln>
+            <a:solidFill>
+              <a:srgbClr val="000000"/>
+            </a:solidFill>
+            <a:miter lim="800000"/>
+            <a:headEnd/>
+            <a:tailEnd/>
+          </a:ln>
+        </p:spPr>
+      </p:sp>
+      <p:sp>
+        <p:nvSpPr>
+          <p:cNvPr id="12290" name="Rectangle 2"/>
+          <p:cNvSpPr txBox="1">
+            <a:spLocks noChangeArrowheads="1"/>
+          </p:cNvSpPr>
+          <p:nvPr>
+            <p:ph type="body" idx="1"/>
+          </p:nvPr>
+        </p:nvSpPr>
+        <p:spPr bwMode="auto">
+          <a:xfrm>
+            <a:off x="685512" y="4343230"/>
+            <a:ext cx="5486976" cy="4115139"/>
+          </a:xfrm>
+          <a:prstGeom prst="rect">
+            <a:avLst/>
+          </a:prstGeom>
+          <a:noFill/>
+          <a:ln cap="flat">
+            <a:round/>
+            <a:headEnd/>
+            <a:tailEnd/>
+          </a:ln>
+        </p:spPr>
+        <p:txBody>
+          <a:bodyPr wrap="none" anchor="ctr"/>
+          <a:lstStyle/>
+          <a:p>
+            <a:endParaRPr lang="ko-KR" altLang="ko-KR"/>
+          </a:p>
+        </p:txBody>
+      </p:sp>
+    </p:spTree>
+  </p:cSld>
+  <p:clrMapOvr>
+    <a:masterClrMapping/>
+  </p:clrMapOvr>
+</p:notes>
+</file>
+
+<file path=ppt/notesSlides/notesSlide3.xml><?xml version="1.0" encoding="utf-8"?>
+<p:notes xmlns:a="http://schemas.openxmlformats.org/drawingml/2006/main" xmlns:r="http://schemas.openxmlformats.org/officeDocument/2006/relationships" xmlns:p="http://schemas.openxmlformats.org/presentationml/2006/main">
+  <p:cSld>
+    <p:bg>
+      <p:bgPr>
+        <a:solidFill>
+          <a:srgbClr val="FFFFFF"/>
+        </a:solidFill>
+        <a:effectLst/>
+      </p:bgPr>
+    </p:bg>
+    <p:spTree>
+      <p:nvGrpSpPr>
+        <p:cNvPr id="1" name=""/>
+        <p:cNvGrpSpPr/>
+        <p:nvPr/>
+      </p:nvGrpSpPr>
+      <p:grpSpPr>
+        <a:xfrm>
+          <a:off x="0" y="0"/>
+          <a:ext cx="0" cy="0"/>
+          <a:chOff x="0" y="0"/>
+          <a:chExt cx="0" cy="0"/>
+        </a:xfrm>
+      </p:grpSpPr>
+      <p:sp>
+        <p:nvSpPr>
+          <p:cNvPr id="7" name="Rectangle 6"/>
+          <p:cNvSpPr>
+            <a:spLocks noGrp="1" noChangeArrowheads="1"/>
+          </p:cNvSpPr>
+          <p:nvPr>
+            <p:ph type="sldNum"/>
+          </p:nvPr>
+        </p:nvSpPr>
+        <p:spPr>
+          <a:ln/>
+        </p:spPr>
+        <p:txBody>
+          <a:bodyPr/>
+          <a:lstStyle/>
+          <a:p>
+            <a:fld id="{6F516A42-F7C0-4479-A9C1-67DC27E9B28E}" type="slidenum">
+              <a:rPr lang="en-US"/>
+              <a:pPr/>
+              <a:t>6</a:t>
+            </a:fld>
+            <a:endParaRPr lang="en-US"/>
+          </a:p>
+        </p:txBody>
+      </p:sp>
+      <p:sp>
+        <p:nvSpPr>
+          <p:cNvPr id="13313" name="Rectangle 1"/>
+          <p:cNvSpPr txBox="1">
+            <a:spLocks noChangeArrowheads="1"/>
+          </p:cNvSpPr>
+          <p:nvPr>
+            <p:ph type="sldImg"/>
+          </p:nvPr>
+        </p:nvSpPr>
+        <p:spPr bwMode="auto">
+          <a:xfrm>
+            <a:off x="1003786" y="695134"/>
+            <a:ext cx="4848989" cy="3428152"/>
+          </a:xfrm>
+          <a:prstGeom prst="rect">
+            <a:avLst/>
+          </a:prstGeom>
+          <a:solidFill>
+            <a:srgbClr val="FFFFFF"/>
+          </a:solidFill>
+          <a:ln>
+            <a:solidFill>
+              <a:srgbClr val="000000"/>
+            </a:solidFill>
+            <a:miter lim="800000"/>
+            <a:headEnd/>
+            <a:tailEnd/>
+          </a:ln>
+        </p:spPr>
+      </p:sp>
+      <p:sp>
+        <p:nvSpPr>
+          <p:cNvPr id="13314" name="Rectangle 2"/>
+          <p:cNvSpPr txBox="1">
+            <a:spLocks noChangeArrowheads="1"/>
+          </p:cNvSpPr>
+          <p:nvPr>
+            <p:ph type="body" idx="1"/>
+          </p:nvPr>
+        </p:nvSpPr>
+        <p:spPr bwMode="auto">
+          <a:xfrm>
+            <a:off x="685512" y="4343230"/>
+            <a:ext cx="5486976" cy="4115139"/>
+          </a:xfrm>
+          <a:prstGeom prst="rect">
+            <a:avLst/>
+          </a:prstGeom>
+          <a:noFill/>
+          <a:ln cap="flat">
+            <a:round/>
+            <a:headEnd/>
+            <a:tailEnd/>
+          </a:ln>
+        </p:spPr>
+        <p:txBody>
+          <a:bodyPr wrap="none" anchor="ctr"/>
+          <a:lstStyle/>
+          <a:p>
+            <a:endParaRPr lang="ko-KR" altLang="ko-KR"/>
+          </a:p>
+        </p:txBody>
+      </p:sp>
+    </p:spTree>
+  </p:cSld>
+  <p:clrMapOvr>
+    <a:masterClrMapping/>
+  </p:clrMapOvr>
+</p:notes>
+</file>
+
+<file path=ppt/notesSlides/notesSlide4.xml><?xml version="1.0" encoding="utf-8"?>
+<p:notes xmlns:a="http://schemas.openxmlformats.org/drawingml/2006/main" xmlns:r="http://schemas.openxmlformats.org/officeDocument/2006/relationships" xmlns:p="http://schemas.openxmlformats.org/presentationml/2006/main">
+  <p:cSld>
+    <p:bg>
+      <p:bgPr>
+        <a:solidFill>
+          <a:srgbClr val="FFFFFF"/>
+        </a:solidFill>
+        <a:effectLst/>
+      </p:bgPr>
+    </p:bg>
+    <p:spTree>
+      <p:nvGrpSpPr>
+        <p:cNvPr id="1" name=""/>
+        <p:cNvGrpSpPr/>
+        <p:nvPr/>
+      </p:nvGrpSpPr>
+      <p:grpSpPr>
+        <a:xfrm>
+          <a:off x="0" y="0"/>
+          <a:ext cx="0" cy="0"/>
+          <a:chOff x="0" y="0"/>
+          <a:chExt cx="0" cy="0"/>
+        </a:xfrm>
+      </p:grpSpPr>
+      <p:sp>
+        <p:nvSpPr>
+          <p:cNvPr id="7" name="Rectangle 6"/>
+          <p:cNvSpPr>
+            <a:spLocks noGrp="1" noChangeArrowheads="1"/>
+          </p:cNvSpPr>
+          <p:nvPr>
+            <p:ph type="sldNum"/>
+          </p:nvPr>
+        </p:nvSpPr>
+        <p:spPr>
+          <a:ln/>
+        </p:spPr>
+        <p:txBody>
+          <a:bodyPr/>
+          <a:lstStyle/>
+          <a:p>
+            <a:fld id="{5FD0AC68-DAC7-452B-9337-8CD2050D113F}" type="slidenum">
+              <a:rPr lang="en-US"/>
+              <a:pPr/>
+              <a:t>7</a:t>
+            </a:fld>
+            <a:endParaRPr lang="en-US"/>
+          </a:p>
+        </p:txBody>
+      </p:sp>
+      <p:sp>
+        <p:nvSpPr>
+          <p:cNvPr id="14337" name="Rectangle 1"/>
+          <p:cNvSpPr txBox="1">
+            <a:spLocks noChangeArrowheads="1"/>
+          </p:cNvSpPr>
+          <p:nvPr>
+            <p:ph type="sldImg"/>
+          </p:nvPr>
+        </p:nvSpPr>
+        <p:spPr bwMode="auto">
+          <a:xfrm>
+            <a:off x="1003786" y="695134"/>
+            <a:ext cx="4848989" cy="3428152"/>
+          </a:xfrm>
+          <a:prstGeom prst="rect">
+            <a:avLst/>
+          </a:prstGeom>
+          <a:solidFill>
+            <a:srgbClr val="FFFFFF"/>
+          </a:solidFill>
+          <a:ln>
+            <a:solidFill>
+              <a:srgbClr val="000000"/>
+            </a:solidFill>
+            <a:miter lim="800000"/>
+            <a:headEnd/>
+            <a:tailEnd/>
+          </a:ln>
+        </p:spPr>
+      </p:sp>
+      <p:sp>
+        <p:nvSpPr>
+          <p:cNvPr id="14338" name="Rectangle 2"/>
+          <p:cNvSpPr txBox="1">
+            <a:spLocks noChangeArrowheads="1"/>
+          </p:cNvSpPr>
+          <p:nvPr>
+            <p:ph type="body" idx="1"/>
+          </p:nvPr>
+        </p:nvSpPr>
+        <p:spPr bwMode="auto">
+          <a:xfrm>
+            <a:off x="685512" y="4343230"/>
+            <a:ext cx="5486976" cy="4115139"/>
+          </a:xfrm>
+          <a:prstGeom prst="rect">
+            <a:avLst/>
+          </a:prstGeom>
+          <a:noFill/>
+          <a:ln cap="flat">
+            <a:round/>
+            <a:headEnd/>
+            <a:tailEnd/>
+          </a:ln>
+        </p:spPr>
+        <p:txBody>
+          <a:bodyPr wrap="none" anchor="ctr"/>
+          <a:lstStyle/>
+          <a:p>
+            <a:endParaRPr lang="ko-KR" altLang="ko-KR"/>
+          </a:p>
+        </p:txBody>
+      </p:sp>
+    </p:spTree>
+  </p:cSld>
+  <p:clrMapOvr>
+    <a:masterClrMapping/>
+  </p:clrMapOvr>
+</p:notes>
+</file>
+
+<file path=ppt/notesSlides/notesSlide5.xml><?xml version="1.0" encoding="utf-8"?>
+<p:notes xmlns:a="http://schemas.openxmlformats.org/drawingml/2006/main" xmlns:r="http://schemas.openxmlformats.org/officeDocument/2006/relationships" xmlns:p="http://schemas.openxmlformats.org/presentationml/2006/main">
+  <p:cSld>
+    <p:bg>
+      <p:bgPr>
+        <a:solidFill>
+          <a:srgbClr val="FFFFFF"/>
+        </a:solidFill>
+        <a:effectLst/>
+      </p:bgPr>
+    </p:bg>
+    <p:spTree>
+      <p:nvGrpSpPr>
+        <p:cNvPr id="1" name=""/>
+        <p:cNvGrpSpPr/>
+        <p:nvPr/>
+      </p:nvGrpSpPr>
+      <p:grpSpPr>
+        <a:xfrm>
+          <a:off x="0" y="0"/>
+          <a:ext cx="0" cy="0"/>
+          <a:chOff x="0" y="0"/>
+          <a:chExt cx="0" cy="0"/>
+        </a:xfrm>
+      </p:grpSpPr>
+      <p:sp>
+        <p:nvSpPr>
+          <p:cNvPr id="7" name="Rectangle 6"/>
+          <p:cNvSpPr>
+            <a:spLocks noGrp="1" noChangeArrowheads="1"/>
+          </p:cNvSpPr>
+          <p:nvPr>
+            <p:ph type="sldNum"/>
+          </p:nvPr>
+        </p:nvSpPr>
+        <p:spPr>
+          <a:ln/>
+        </p:spPr>
+        <p:txBody>
+          <a:bodyPr/>
+          <a:lstStyle/>
+          <a:p>
+            <a:fld id="{7725C4E3-AEF3-4D7D-AF14-98BFCA726A37}" type="slidenum">
+              <a:rPr lang="en-US"/>
+              <a:pPr/>
+              <a:t>8</a:t>
+            </a:fld>
+            <a:endParaRPr lang="en-US"/>
+          </a:p>
+        </p:txBody>
+      </p:sp>
+      <p:sp>
+        <p:nvSpPr>
+          <p:cNvPr id="15361" name="Rectangle 1"/>
+          <p:cNvSpPr txBox="1">
+            <a:spLocks noChangeArrowheads="1"/>
+          </p:cNvSpPr>
+          <p:nvPr>
+            <p:ph type="sldImg"/>
+          </p:nvPr>
+        </p:nvSpPr>
+        <p:spPr bwMode="auto">
+          <a:xfrm>
+            <a:off x="1003786" y="695134"/>
+            <a:ext cx="4848989" cy="3428152"/>
+          </a:xfrm>
+          <a:prstGeom prst="rect">
+            <a:avLst/>
+          </a:prstGeom>
+          <a:solidFill>
+            <a:srgbClr val="FFFFFF"/>
+          </a:solidFill>
+          <a:ln>
+            <a:solidFill>
+              <a:srgbClr val="000000"/>
+            </a:solidFill>
+            <a:miter lim="800000"/>
+            <a:headEnd/>
+            <a:tailEnd/>
+          </a:ln>
+        </p:spPr>
+      </p:sp>
+      <p:sp>
+        <p:nvSpPr>
+          <p:cNvPr id="15362" name="Rectangle 2"/>
+          <p:cNvSpPr txBox="1">
+            <a:spLocks noChangeArrowheads="1"/>
+          </p:cNvSpPr>
+          <p:nvPr>
+            <p:ph type="body" idx="1"/>
+          </p:nvPr>
+        </p:nvSpPr>
+        <p:spPr bwMode="auto">
+          <a:xfrm>
+            <a:off x="685512" y="4343230"/>
+            <a:ext cx="5486976" cy="4115139"/>
+          </a:xfrm>
+          <a:prstGeom prst="rect">
+            <a:avLst/>
+          </a:prstGeom>
+          <a:noFill/>
+          <a:ln cap="flat">
+            <a:round/>
+            <a:headEnd/>
+            <a:tailEnd/>
+          </a:ln>
+        </p:spPr>
+        <p:txBody>
+          <a:bodyPr wrap="none" anchor="ctr"/>
+          <a:lstStyle/>
+          <a:p>
+            <a:endParaRPr lang="ko-KR" altLang="ko-KR"/>
+          </a:p>
+        </p:txBody>
+      </p:sp>
+    </p:spTree>
+  </p:cSld>
+  <p:clrMapOvr>
+    <a:masterClrMapping/>
+  </p:clrMapOvr>
+</p:notes>
+</file>
+
+<file path=ppt/notesSlides/notesSlide6.xml><?xml version="1.0" encoding="utf-8"?>
+<p:notes xmlns:a="http://schemas.openxmlformats.org/drawingml/2006/main" xmlns:r="http://schemas.openxmlformats.org/officeDocument/2006/relationships" xmlns:p="http://schemas.openxmlformats.org/presentationml/2006/main">
+  <p:cSld>
+    <p:bg>
+      <p:bgPr>
+        <a:solidFill>
+          <a:srgbClr val="FFFFFF"/>
+        </a:solidFill>
+        <a:effectLst/>
+      </p:bgPr>
+    </p:bg>
+    <p:spTree>
+      <p:nvGrpSpPr>
+        <p:cNvPr id="1" name=""/>
+        <p:cNvGrpSpPr/>
+        <p:nvPr/>
+      </p:nvGrpSpPr>
+      <p:grpSpPr>
+        <a:xfrm>
+          <a:off x="0" y="0"/>
+          <a:ext cx="0" cy="0"/>
+          <a:chOff x="0" y="0"/>
+          <a:chExt cx="0" cy="0"/>
+        </a:xfrm>
+      </p:grpSpPr>
+      <p:sp>
+        <p:nvSpPr>
+          <p:cNvPr id="7" name="Rectangle 6"/>
+          <p:cNvSpPr>
+            <a:spLocks noGrp="1" noChangeArrowheads="1"/>
+          </p:cNvSpPr>
+          <p:nvPr>
+            <p:ph type="sldNum"/>
+          </p:nvPr>
+        </p:nvSpPr>
+        <p:spPr>
+          <a:ln/>
+        </p:spPr>
+        <p:txBody>
+          <a:bodyPr/>
+          <a:lstStyle/>
+          <a:p>
+            <a:fld id="{2277D32A-A68F-4FA4-B923-DA83ED06D4A3}" type="slidenum">
+              <a:rPr lang="en-US"/>
+              <a:pPr/>
+              <a:t>9</a:t>
+            </a:fld>
+            <a:endParaRPr lang="en-US"/>
+          </a:p>
+        </p:txBody>
+      </p:sp>
+      <p:sp>
+        <p:nvSpPr>
+          <p:cNvPr id="16385" name="Rectangle 1"/>
+          <p:cNvSpPr txBox="1">
+            <a:spLocks noChangeArrowheads="1"/>
+          </p:cNvSpPr>
+          <p:nvPr>
+            <p:ph type="sldImg"/>
+          </p:nvPr>
+        </p:nvSpPr>
+        <p:spPr bwMode="auto">
+          <a:xfrm>
+            <a:off x="1003786" y="695134"/>
+            <a:ext cx="4848989" cy="3428152"/>
+          </a:xfrm>
+          <a:prstGeom prst="rect">
+            <a:avLst/>
+          </a:prstGeom>
+          <a:solidFill>
+            <a:srgbClr val="FFFFFF"/>
+          </a:solidFill>
+          <a:ln>
+            <a:solidFill>
+              <a:srgbClr val="000000"/>
+            </a:solidFill>
+            <a:miter lim="800000"/>
+            <a:headEnd/>
+            <a:tailEnd/>
+          </a:ln>
+        </p:spPr>
+      </p:sp>
+      <p:sp>
+        <p:nvSpPr>
+          <p:cNvPr id="16386" name="Rectangle 2"/>
+          <p:cNvSpPr txBox="1">
+            <a:spLocks noChangeArrowheads="1"/>
+          </p:cNvSpPr>
+          <p:nvPr>
+            <p:ph type="body" idx="1"/>
+          </p:nvPr>
+        </p:nvSpPr>
+        <p:spPr bwMode="auto">
+          <a:xfrm>
+            <a:off x="685512" y="4343230"/>
+            <a:ext cx="5486976" cy="4115139"/>
+          </a:xfrm>
+          <a:prstGeom prst="rect">
+            <a:avLst/>
+          </a:prstGeom>
+          <a:noFill/>
+          <a:ln cap="flat">
+            <a:round/>
+            <a:headEnd/>
+            <a:tailEnd/>
+          </a:ln>
+        </p:spPr>
+        <p:txBody>
+          <a:bodyPr wrap="none" anchor="ctr"/>
+          <a:lstStyle/>
+          <a:p>
+            <a:endParaRPr lang="ko-KR" altLang="ko-KR"/>
+          </a:p>
+        </p:txBody>
+      </p:sp>
+    </p:spTree>
+  </p:cSld>
+  <p:clrMapOvr>
+    <a:masterClrMapping/>
+  </p:clrMapOvr>
+</p:notes>
+</file>
+
+<file path=ppt/notesSlides/notesSlide7.xml><?xml version="1.0" encoding="utf-8"?>
+<p:notes xmlns:a="http://schemas.openxmlformats.org/drawingml/2006/main" xmlns:r="http://schemas.openxmlformats.org/officeDocument/2006/relationships" xmlns:p="http://schemas.openxmlformats.org/presentationml/2006/main">
+  <p:cSld>
+    <p:bg>
+      <p:bgPr>
+        <a:solidFill>
+          <a:srgbClr val="FFFFFF"/>
+        </a:solidFill>
+        <a:effectLst/>
+      </p:bgPr>
+    </p:bg>
+    <p:spTree>
+      <p:nvGrpSpPr>
+        <p:cNvPr id="1" name=""/>
+        <p:cNvGrpSpPr/>
+        <p:nvPr/>
+      </p:nvGrpSpPr>
+      <p:grpSpPr>
+        <a:xfrm>
+          <a:off x="0" y="0"/>
+          <a:ext cx="0" cy="0"/>
+          <a:chOff x="0" y="0"/>
+          <a:chExt cx="0" cy="0"/>
+        </a:xfrm>
+      </p:grpSpPr>
+      <p:sp>
+        <p:nvSpPr>
+          <p:cNvPr id="7" name="Rectangle 6"/>
+          <p:cNvSpPr>
+            <a:spLocks noGrp="1" noChangeArrowheads="1"/>
+          </p:cNvSpPr>
+          <p:nvPr>
+            <p:ph type="sldNum"/>
+          </p:nvPr>
+        </p:nvSpPr>
+        <p:spPr>
+          <a:ln/>
+        </p:spPr>
+        <p:txBody>
+          <a:bodyPr/>
+          <a:lstStyle/>
+          <a:p>
+            <a:fld id="{6428AEAA-A74F-453D-B101-E51BAFA57058}" type="slidenum">
+              <a:rPr lang="en-US"/>
+              <a:pPr/>
+              <a:t>10</a:t>
+            </a:fld>
+            <a:endParaRPr lang="en-US"/>
+          </a:p>
+        </p:txBody>
+      </p:sp>
+      <p:sp>
+        <p:nvSpPr>
+          <p:cNvPr id="17409" name="Rectangle 1"/>
+          <p:cNvSpPr txBox="1">
+            <a:spLocks noChangeArrowheads="1"/>
+          </p:cNvSpPr>
+          <p:nvPr>
+            <p:ph type="sldImg"/>
+          </p:nvPr>
+        </p:nvSpPr>
+        <p:spPr bwMode="auto">
+          <a:xfrm>
+            <a:off x="1003786" y="695134"/>
+            <a:ext cx="4848989" cy="3428152"/>
+          </a:xfrm>
+          <a:prstGeom prst="rect">
+            <a:avLst/>
+          </a:prstGeom>
+          <a:solidFill>
+            <a:srgbClr val="FFFFFF"/>
+          </a:solidFill>
+          <a:ln>
+            <a:solidFill>
+              <a:srgbClr val="000000"/>
+            </a:solidFill>
+            <a:miter lim="800000"/>
+            <a:headEnd/>
+            <a:tailEnd/>
+          </a:ln>
+        </p:spPr>
+      </p:sp>
+      <p:sp>
+        <p:nvSpPr>
+          <p:cNvPr id="17410" name="Rectangle 2"/>
+          <p:cNvSpPr txBox="1">
+            <a:spLocks noChangeArrowheads="1"/>
+          </p:cNvSpPr>
+          <p:nvPr>
+            <p:ph type="body" idx="1"/>
+          </p:nvPr>
+        </p:nvSpPr>
+        <p:spPr bwMode="auto">
+          <a:xfrm>
+            <a:off x="685512" y="4343230"/>
+            <a:ext cx="5486976" cy="4115139"/>
+          </a:xfrm>
+          <a:prstGeom prst="rect">
+            <a:avLst/>
+          </a:prstGeom>
+          <a:noFill/>
+          <a:ln cap="flat">
+            <a:round/>
+            <a:headEnd/>
+            <a:tailEnd/>
+          </a:ln>
+        </p:spPr>
+        <p:txBody>
+          <a:bodyPr wrap="none" anchor="ctr"/>
+          <a:lstStyle/>
+          <a:p>
+            <a:endParaRPr lang="ko-KR" altLang="ko-KR"/>
+          </a:p>
+        </p:txBody>
+      </p:sp>
+    </p:spTree>
+  </p:cSld>
+  <p:clrMapOvr>
+    <a:masterClrMapping/>
+  </p:clrMapOvr>
+</p:notes>
+</file>
+
+<file path=ppt/notesSlides/notesSlide8.xml><?xml version="1.0" encoding="utf-8"?>
+<p:notes xmlns:a="http://schemas.openxmlformats.org/drawingml/2006/main" xmlns:r="http://schemas.openxmlformats.org/officeDocument/2006/relationships" xmlns:p="http://schemas.openxmlformats.org/presentationml/2006/main">
+  <p:cSld>
+    <p:bg>
+      <p:bgPr>
+        <a:solidFill>
+          <a:srgbClr val="FFFFFF"/>
+        </a:solidFill>
+        <a:effectLst/>
+      </p:bgPr>
+    </p:bg>
+    <p:spTree>
+      <p:nvGrpSpPr>
+        <p:cNvPr id="1" name=""/>
+        <p:cNvGrpSpPr/>
+        <p:nvPr/>
+      </p:nvGrpSpPr>
+      <p:grpSpPr>
+        <a:xfrm>
+          <a:off x="0" y="0"/>
+          <a:ext cx="0" cy="0"/>
+          <a:chOff x="0" y="0"/>
+          <a:chExt cx="0" cy="0"/>
+        </a:xfrm>
+      </p:grpSpPr>
+      <p:sp>
+        <p:nvSpPr>
+          <p:cNvPr id="7" name="Rectangle 6"/>
+          <p:cNvSpPr>
+            <a:spLocks noGrp="1" noChangeArrowheads="1"/>
+          </p:cNvSpPr>
+          <p:nvPr>
+            <p:ph type="sldNum"/>
+          </p:nvPr>
+        </p:nvSpPr>
+        <p:spPr>
+          <a:ln/>
+        </p:spPr>
+        <p:txBody>
+          <a:bodyPr/>
+          <a:lstStyle/>
+          <a:p>
+            <a:fld id="{DA4EDB21-4D83-48D1-81AA-980BCF916D9C}" type="slidenum">
+              <a:rPr lang="en-US"/>
+              <a:pPr/>
+              <a:t>11</a:t>
+            </a:fld>
+            <a:endParaRPr lang="en-US"/>
+          </a:p>
+        </p:txBody>
+      </p:sp>
+      <p:sp>
+        <p:nvSpPr>
+          <p:cNvPr id="18433" name="Rectangle 1"/>
+          <p:cNvSpPr txBox="1">
+            <a:spLocks noChangeArrowheads="1"/>
+          </p:cNvSpPr>
+          <p:nvPr>
+            <p:ph type="sldImg"/>
+          </p:nvPr>
+        </p:nvSpPr>
+        <p:spPr bwMode="auto">
+          <a:xfrm>
+            <a:off x="1003786" y="695134"/>
+            <a:ext cx="4848989" cy="3428152"/>
+          </a:xfrm>
+          <a:prstGeom prst="rect">
+            <a:avLst/>
+          </a:prstGeom>
+          <a:solidFill>
+            <a:srgbClr val="FFFFFF"/>
+          </a:solidFill>
+          <a:ln>
+            <a:solidFill>
+              <a:srgbClr val="000000"/>
+            </a:solidFill>
+            <a:miter lim="800000"/>
+            <a:headEnd/>
+            <a:tailEnd/>
+          </a:ln>
+        </p:spPr>
+      </p:sp>
+      <p:sp>
+        <p:nvSpPr>
+          <p:cNvPr id="18434" name="Rectangle 2"/>
+          <p:cNvSpPr txBox="1">
+            <a:spLocks noChangeArrowheads="1"/>
+          </p:cNvSpPr>
+          <p:nvPr>
+            <p:ph type="body" idx="1"/>
+          </p:nvPr>
+        </p:nvSpPr>
+        <p:spPr bwMode="auto">
+          <a:xfrm>
+            <a:off x="685512" y="4343230"/>
+            <a:ext cx="5486976" cy="4115139"/>
+          </a:xfrm>
+          <a:prstGeom prst="rect">
+            <a:avLst/>
+          </a:prstGeom>
+          <a:noFill/>
+          <a:ln cap="flat">
+            <a:round/>
+            <a:headEnd/>
+            <a:tailEnd/>
+          </a:ln>
+        </p:spPr>
+        <p:txBody>
+          <a:bodyPr wrap="none" anchor="ctr"/>
+          <a:lstStyle/>
+          <a:p>
+            <a:endParaRPr lang="ko-KR" altLang="ko-KR"/>
+          </a:p>
+        </p:txBody>
+      </p:sp>
+    </p:spTree>
+  </p:cSld>
+  <p:clrMapOvr>
+    <a:masterClrMapping/>
+  </p:clrMapOvr>
+</p:notes>
+</file>
+
 <file path=ppt/slideLayouts/slideLayout1.xml><?xml version="1.0" encoding="utf-8"?>
 <p:sldLayout xmlns:a="http://schemas.openxmlformats.org/drawingml/2006/main" xmlns:r="http://schemas.openxmlformats.org/officeDocument/2006/relationships" xmlns:p="http://schemas.openxmlformats.org/presentationml/2006/main" type="title" preserve="1">
   <p:cSld name="제목 슬라이드">
@@ -296,7 +1637,7 @@
             <a:fld id="{0FB34BDD-B7C9-46C2-B4CA-E9DEC5875A75}" type="datetimeFigureOut">
               <a:rPr lang="ko-KR" altLang="en-US" smtClean="0"/>
               <a:pPr/>
-              <a:t>2016-10-28</a:t>
+              <a:t>2017-01-11</a:t>
             </a:fld>
             <a:endParaRPr lang="ko-KR" altLang="en-US"/>
           </a:p>
@@ -463,7 +1804,7 @@
             <a:fld id="{0FB34BDD-B7C9-46C2-B4CA-E9DEC5875A75}" type="datetimeFigureOut">
               <a:rPr lang="ko-KR" altLang="en-US" smtClean="0"/>
               <a:pPr/>
-              <a:t>2016-10-28</a:t>
+              <a:t>2017-01-11</a:t>
             </a:fld>
             <a:endParaRPr lang="ko-KR" altLang="en-US"/>
           </a:p>
@@ -640,7 +1981,7 @@
             <a:fld id="{0FB34BDD-B7C9-46C2-B4CA-E9DEC5875A75}" type="datetimeFigureOut">
               <a:rPr lang="ko-KR" altLang="en-US" smtClean="0"/>
               <a:pPr/>
-              <a:t>2016-10-28</a:t>
+              <a:t>2017-01-11</a:t>
             </a:fld>
             <a:endParaRPr lang="ko-KR" altLang="en-US"/>
           </a:p>
@@ -686,6 +2027,148 @@
               <a:t>‹#›</a:t>
             </a:fld>
             <a:endParaRPr lang="ko-KR" altLang="en-US"/>
+          </a:p>
+        </p:txBody>
+      </p:sp>
+    </p:spTree>
+  </p:cSld>
+  <p:clrMapOvr>
+    <a:masterClrMapping/>
+  </p:clrMapOvr>
+</p:sldLayout>
+</file>
+
+<file path=ppt/slideLayouts/slideLayout12.xml><?xml version="1.0" encoding="utf-8"?>
+<p:sldLayout xmlns:a="http://schemas.openxmlformats.org/drawingml/2006/main" xmlns:r="http://schemas.openxmlformats.org/officeDocument/2006/relationships" xmlns:p="http://schemas.openxmlformats.org/presentationml/2006/main">
+  <p:cSld name="사용자 지정 레이아웃">
+    <p:spTree>
+      <p:nvGrpSpPr>
+        <p:cNvPr id="1" name=""/>
+        <p:cNvGrpSpPr/>
+        <p:nvPr/>
+      </p:nvGrpSpPr>
+      <p:grpSpPr>
+        <a:xfrm>
+          <a:off x="0" y="0"/>
+          <a:ext cx="0" cy="0"/>
+          <a:chOff x="0" y="0"/>
+          <a:chExt cx="0" cy="0"/>
+        </a:xfrm>
+      </p:grpSpPr>
+      <p:sp>
+        <p:nvSpPr>
+          <p:cNvPr id="2" name="제목 1"/>
+          <p:cNvSpPr>
+            <a:spLocks noGrp="1"/>
+          </p:cNvSpPr>
+          <p:nvPr>
+            <p:ph type="title"/>
+          </p:nvPr>
+        </p:nvSpPr>
+        <p:spPr>
+          <a:xfrm>
+            <a:off x="456481" y="273629"/>
+            <a:ext cx="8226720" cy="1143480"/>
+          </a:xfrm>
+        </p:spPr>
+        <p:txBody>
+          <a:bodyPr/>
+          <a:lstStyle/>
+          <a:p>
+            <a:r>
+              <a:rPr lang="ko-KR" altLang="en-US" smtClean="0"/>
+              <a:t>마스터 제목 스타일 편집</a:t>
+            </a:r>
+            <a:endParaRPr lang="ko-KR" altLang="en-US"/>
+          </a:p>
+        </p:txBody>
+      </p:sp>
+      <p:sp>
+        <p:nvSpPr>
+          <p:cNvPr id="3" name="날짜 개체 틀 2"/>
+          <p:cNvSpPr>
+            <a:spLocks noGrp="1"/>
+          </p:cNvSpPr>
+          <p:nvPr>
+            <p:ph type="dt" idx="10"/>
+          </p:nvPr>
+        </p:nvSpPr>
+        <p:spPr>
+          <a:xfrm>
+            <a:off x="456481" y="6247376"/>
+            <a:ext cx="2128320" cy="470930"/>
+          </a:xfrm>
+        </p:spPr>
+        <p:txBody>
+          <a:bodyPr/>
+          <a:lstStyle>
+            <a:lvl1pPr>
+              <a:defRPr/>
+            </a:lvl1pPr>
+          </a:lstStyle>
+          <a:p>
+            <a:endParaRPr lang="en-US"/>
+          </a:p>
+        </p:txBody>
+      </p:sp>
+      <p:sp>
+        <p:nvSpPr>
+          <p:cNvPr id="4" name="바닥글 개체 틀 3"/>
+          <p:cNvSpPr>
+            <a:spLocks noGrp="1"/>
+          </p:cNvSpPr>
+          <p:nvPr>
+            <p:ph type="ftr" idx="11"/>
+          </p:nvPr>
+        </p:nvSpPr>
+        <p:spPr>
+          <a:xfrm>
+            <a:off x="3127680" y="6247376"/>
+            <a:ext cx="2897280" cy="470930"/>
+          </a:xfrm>
+        </p:spPr>
+        <p:txBody>
+          <a:bodyPr/>
+          <a:lstStyle>
+            <a:lvl1pPr>
+              <a:defRPr/>
+            </a:lvl1pPr>
+          </a:lstStyle>
+          <a:p>
+            <a:endParaRPr lang="en-US"/>
+          </a:p>
+        </p:txBody>
+      </p:sp>
+      <p:sp>
+        <p:nvSpPr>
+          <p:cNvPr id="5" name="슬라이드 번호 개체 틀 4"/>
+          <p:cNvSpPr>
+            <a:spLocks noGrp="1"/>
+          </p:cNvSpPr>
+          <p:nvPr>
+            <p:ph type="sldNum" idx="12"/>
+          </p:nvPr>
+        </p:nvSpPr>
+        <p:spPr>
+          <a:xfrm>
+            <a:off x="6556321" y="6247376"/>
+            <a:ext cx="2128320" cy="470930"/>
+          </a:xfrm>
+        </p:spPr>
+        <p:txBody>
+          <a:bodyPr/>
+          <a:lstStyle>
+            <a:lvl1pPr>
+              <a:defRPr/>
+            </a:lvl1pPr>
+          </a:lstStyle>
+          <a:p>
+            <a:fld id="{A87C9E48-F622-4CDF-90BD-11BB8876A492}" type="slidenum">
+              <a:rPr lang="en-US"/>
+              <a:pPr/>
+              <a:t>‹#›</a:t>
+            </a:fld>
+            <a:endParaRPr lang="en-US"/>
           </a:p>
         </p:txBody>
       </p:sp>
@@ -807,7 +2290,7 @@
             <a:fld id="{0FB34BDD-B7C9-46C2-B4CA-E9DEC5875A75}" type="datetimeFigureOut">
               <a:rPr lang="ko-KR" altLang="en-US" smtClean="0"/>
               <a:pPr/>
-              <a:t>2016-10-28</a:t>
+              <a:t>2017-01-11</a:t>
             </a:fld>
             <a:endParaRPr lang="ko-KR" altLang="en-US"/>
           </a:p>
@@ -1050,7 +2533,7 @@
             <a:fld id="{0FB34BDD-B7C9-46C2-B4CA-E9DEC5875A75}" type="datetimeFigureOut">
               <a:rPr lang="ko-KR" altLang="en-US" smtClean="0"/>
               <a:pPr/>
-              <a:t>2016-10-28</a:t>
+              <a:t>2017-01-11</a:t>
             </a:fld>
             <a:endParaRPr lang="ko-KR" altLang="en-US"/>
           </a:p>
@@ -1335,7 +2818,7 @@
             <a:fld id="{0FB34BDD-B7C9-46C2-B4CA-E9DEC5875A75}" type="datetimeFigureOut">
               <a:rPr lang="ko-KR" altLang="en-US" smtClean="0"/>
               <a:pPr/>
-              <a:t>2016-10-28</a:t>
+              <a:t>2017-01-11</a:t>
             </a:fld>
             <a:endParaRPr lang="ko-KR" altLang="en-US"/>
           </a:p>
@@ -1754,7 +3237,7 @@
             <a:fld id="{0FB34BDD-B7C9-46C2-B4CA-E9DEC5875A75}" type="datetimeFigureOut">
               <a:rPr lang="ko-KR" altLang="en-US" smtClean="0"/>
               <a:pPr/>
-              <a:t>2016-10-28</a:t>
+              <a:t>2017-01-11</a:t>
             </a:fld>
             <a:endParaRPr lang="ko-KR" altLang="en-US"/>
           </a:p>
@@ -1869,7 +3352,7 @@
             <a:fld id="{0FB34BDD-B7C9-46C2-B4CA-E9DEC5875A75}" type="datetimeFigureOut">
               <a:rPr lang="ko-KR" altLang="en-US" smtClean="0"/>
               <a:pPr/>
-              <a:t>2016-10-28</a:t>
+              <a:t>2017-01-11</a:t>
             </a:fld>
             <a:endParaRPr lang="ko-KR" altLang="en-US"/>
           </a:p>
@@ -1961,7 +3444,7 @@
             <a:fld id="{0FB34BDD-B7C9-46C2-B4CA-E9DEC5875A75}" type="datetimeFigureOut">
               <a:rPr lang="ko-KR" altLang="en-US" smtClean="0"/>
               <a:pPr/>
-              <a:t>2016-10-28</a:t>
+              <a:t>2017-01-11</a:t>
             </a:fld>
             <a:endParaRPr lang="ko-KR" altLang="en-US"/>
           </a:p>
@@ -2235,7 +3718,7 @@
             <a:fld id="{0FB34BDD-B7C9-46C2-B4CA-E9DEC5875A75}" type="datetimeFigureOut">
               <a:rPr lang="ko-KR" altLang="en-US" smtClean="0"/>
               <a:pPr/>
-              <a:t>2016-10-28</a:t>
+              <a:t>2017-01-11</a:t>
             </a:fld>
             <a:endParaRPr lang="ko-KR" altLang="en-US"/>
           </a:p>
@@ -2485,7 +3968,7 @@
             <a:fld id="{0FB34BDD-B7C9-46C2-B4CA-E9DEC5875A75}" type="datetimeFigureOut">
               <a:rPr lang="ko-KR" altLang="en-US" smtClean="0"/>
               <a:pPr/>
-              <a:t>2016-10-28</a:t>
+              <a:t>2017-01-11</a:t>
             </a:fld>
             <a:endParaRPr lang="ko-KR" altLang="en-US"/>
           </a:p>
@@ -2695,7 +4178,7 @@
             <a:fld id="{0FB34BDD-B7C9-46C2-B4CA-E9DEC5875A75}" type="datetimeFigureOut">
               <a:rPr lang="ko-KR" altLang="en-US" smtClean="0"/>
               <a:pPr/>
-              <a:t>2016-10-28</a:t>
+              <a:t>2017-01-11</a:t>
             </a:fld>
             <a:endParaRPr lang="ko-KR" altLang="en-US"/>
           </a:p>
@@ -2795,6 +4278,7 @@
     <p:sldLayoutId id="2147483657" r:id="rId9"/>
     <p:sldLayoutId id="2147483658" r:id="rId10"/>
     <p:sldLayoutId id="2147483659" r:id="rId11"/>
+    <p:sldLayoutId id="2147483660" r:id="rId12"/>
   </p:sldLayoutIdLst>
   <p:txStyles>
     <p:titleStyle>
@@ -3256,7 +4740,7 @@
 </p:sld>
 </file>
 
-<file path=ppt/slides/slide2.xml><?xml version="1.0" encoding="utf-8"?>
+<file path=ppt/slides/slide10.xml><?xml version="1.0" encoding="utf-8"?>
 <p:sld xmlns:a="http://schemas.openxmlformats.org/drawingml/2006/main" xmlns:r="http://schemas.openxmlformats.org/officeDocument/2006/relationships" xmlns:p="http://schemas.openxmlformats.org/presentationml/2006/main">
   <p:cSld>
     <p:spTree>
@@ -3275,9 +4759,9 @@
       </p:grpSpPr>
       <p:sp>
         <p:nvSpPr>
-          <p:cNvPr id="2" name="제목 1"/>
-          <p:cNvSpPr>
-            <a:spLocks noGrp="1"/>
+          <p:cNvPr id="9217" name="Rectangle 1"/>
+          <p:cNvSpPr>
+            <a:spLocks noGrp="1" noChangeArrowheads="1"/>
           </p:cNvSpPr>
           <p:nvPr>
             <p:ph type="title"/>
@@ -3285,34 +4769,50 @@
         </p:nvSpPr>
         <p:spPr>
           <a:xfrm>
-            <a:off x="467544" y="0"/>
-            <a:ext cx="8229600" cy="1143000"/>
-          </a:xfrm>
-        </p:spPr>
-        <p:txBody>
-          <a:bodyPr/>
+            <a:off x="456481" y="77768"/>
+            <a:ext cx="8228160" cy="640868"/>
+          </a:xfrm>
+          <a:ln/>
+        </p:spPr>
+        <p:txBody>
+          <a:bodyPr tIns="20116">
+            <a:normAutofit fontScale="90000"/>
+          </a:bodyPr>
           <a:lstStyle/>
           <a:p>
-            <a:r>
-              <a:rPr lang="en-US" altLang="ko-KR" dirty="0" smtClean="0"/>
-              <a:t>1. Sound</a:t>
-            </a:r>
-            <a:endParaRPr lang="ko-KR" altLang="en-US" dirty="0"/>
+            <a:pPr>
+              <a:tabLst>
+                <a:tab pos="656650" algn="l"/>
+                <a:tab pos="1313299" algn="l"/>
+                <a:tab pos="1969949" algn="l"/>
+                <a:tab pos="2626599" algn="l"/>
+                <a:tab pos="3283248" algn="l"/>
+                <a:tab pos="3939898" algn="l"/>
+                <a:tab pos="4596548" algn="l"/>
+                <a:tab pos="5253198" algn="l"/>
+                <a:tab pos="5909847" algn="l"/>
+                <a:tab pos="6566497" algn="l"/>
+                <a:tab pos="7223147" algn="l"/>
+                <a:tab pos="7879796" algn="l"/>
+              </a:tabLst>
+            </a:pPr>
+            <a:r>
+              <a:rPr lang="en-US" dirty="0"/>
+              <a:t>3. Character Animation (Zombie)</a:t>
+            </a:r>
           </a:p>
         </p:txBody>
       </p:sp>
       <p:pic>
         <p:nvPicPr>
-          <p:cNvPr id="2050" name="Picture 2"/>
+          <p:cNvPr id="9218" name="Picture 2"/>
           <p:cNvPicPr>
-            <a:picLocks noGrp="1" noChangeAspect="1" noChangeArrowheads="1"/>
+            <a:picLocks noChangeAspect="1" noChangeArrowheads="1"/>
           </p:cNvPicPr>
-          <p:nvPr>
-            <p:ph idx="1"/>
-          </p:nvPr>
+          <p:nvPr/>
         </p:nvPicPr>
         <p:blipFill>
-          <a:blip r:embed="rId2" cstate="print"/>
+          <a:blip r:embed="rId3" cstate="print"/>
           <a:srcRect/>
           <a:stretch>
             <a:fillRect/>
@@ -3320,19 +4820,20 @@
         </p:blipFill>
         <p:spPr bwMode="auto">
           <a:xfrm>
-            <a:off x="81699" y="980728"/>
-            <a:ext cx="8954797" cy="5145435"/>
+            <a:off x="787681" y="843929"/>
+            <a:ext cx="7571520" cy="5818211"/>
           </a:xfrm>
           <a:prstGeom prst="rect">
             <a:avLst/>
           </a:prstGeom>
           <a:noFill/>
-          <a:ln w="9525">
+          <a:ln w="9525" cap="flat">
             <a:noFill/>
-            <a:miter lim="800000"/>
+            <a:round/>
             <a:headEnd/>
             <a:tailEnd/>
           </a:ln>
+          <a:effectLst/>
         </p:spPr>
       </p:pic>
     </p:spTree>
@@ -3340,10 +4841,38 @@
   <p:clrMapOvr>
     <a:masterClrMapping/>
   </p:clrMapOvr>
+  <p:transition spd="med"/>
+  <p:timing>
+    <p:tnLst>
+      <p:par>
+        <p:cTn id="1" dur="indefinite" nodeType="tmRoot">
+          <p:childTnLst>
+            <p:seq concurrent="1" nextAc="seek">
+              <p:cTn id="2" dur="0" nodeType="mainSeq"/>
+              <p:prevCondLst>
+                <p:cond evt="onPrev" delay="0">
+                  <p:tgtEl>
+                    <p:sldTgt/>
+                  </p:tgtEl>
+                </p:cond>
+              </p:prevCondLst>
+              <p:nextCondLst>
+                <p:cond evt="onNext" delay="0">
+                  <p:tgtEl>
+                    <p:sldTgt/>
+                  </p:tgtEl>
+                </p:cond>
+              </p:nextCondLst>
+            </p:seq>
+          </p:childTnLst>
+        </p:cTn>
+      </p:par>
+    </p:tnLst>
+  </p:timing>
 </p:sld>
 </file>
 
-<file path=ppt/slides/slide3.xml><?xml version="1.0" encoding="utf-8"?>
+<file path=ppt/slides/slide11.xml><?xml version="1.0" encoding="utf-8"?>
 <p:sld xmlns:a="http://schemas.openxmlformats.org/drawingml/2006/main" xmlns:r="http://schemas.openxmlformats.org/officeDocument/2006/relationships" xmlns:p="http://schemas.openxmlformats.org/presentationml/2006/main">
   <p:cSld>
     <p:spTree>
@@ -3362,9 +4891,9 @@
       </p:grpSpPr>
       <p:sp>
         <p:nvSpPr>
-          <p:cNvPr id="2" name="제목 1"/>
-          <p:cNvSpPr>
-            <a:spLocks noGrp="1"/>
+          <p:cNvPr id="10241" name="Rectangle 1"/>
+          <p:cNvSpPr>
+            <a:spLocks noGrp="1" noChangeArrowheads="1"/>
           </p:cNvSpPr>
           <p:nvPr>
             <p:ph type="title"/>
@@ -3372,32 +4901,50 @@
         </p:nvSpPr>
         <p:spPr>
           <a:xfrm>
-            <a:off x="467544" y="0"/>
-            <a:ext cx="8229600" cy="1143000"/>
-          </a:xfrm>
-        </p:spPr>
-        <p:txBody>
-          <a:bodyPr/>
+            <a:off x="456481" y="77768"/>
+            <a:ext cx="8228160" cy="640868"/>
+          </a:xfrm>
+          <a:ln/>
+        </p:spPr>
+        <p:txBody>
+          <a:bodyPr tIns="20116">
+            <a:normAutofit fontScale="90000"/>
+          </a:bodyPr>
           <a:lstStyle/>
           <a:p>
-            <a:r>
-              <a:rPr lang="en-US" altLang="ko-KR" dirty="0" smtClean="0"/>
-              <a:t>2.Character</a:t>
-            </a:r>
-            <a:endParaRPr lang="ko-KR" altLang="en-US" dirty="0"/>
+            <a:pPr>
+              <a:tabLst>
+                <a:tab pos="656650" algn="l"/>
+                <a:tab pos="1313299" algn="l"/>
+                <a:tab pos="1969949" algn="l"/>
+                <a:tab pos="2626599" algn="l"/>
+                <a:tab pos="3283248" algn="l"/>
+                <a:tab pos="3939898" algn="l"/>
+                <a:tab pos="4596548" algn="l"/>
+                <a:tab pos="5253198" algn="l"/>
+                <a:tab pos="5909847" algn="l"/>
+                <a:tab pos="6566497" algn="l"/>
+                <a:tab pos="7223147" algn="l"/>
+                <a:tab pos="7879796" algn="l"/>
+              </a:tabLst>
+            </a:pPr>
+            <a:r>
+              <a:rPr lang="en-US" dirty="0"/>
+              <a:t>3. Character Animation (Zombie)</a:t>
+            </a:r>
           </a:p>
         </p:txBody>
       </p:sp>
       <p:pic>
         <p:nvPicPr>
-          <p:cNvPr id="3" name="Picture 2"/>
+          <p:cNvPr id="10242" name="Picture 2"/>
           <p:cNvPicPr>
             <a:picLocks noChangeAspect="1" noChangeArrowheads="1"/>
           </p:cNvPicPr>
           <p:nvPr/>
         </p:nvPicPr>
         <p:blipFill>
-          <a:blip r:embed="rId2" cstate="print"/>
+          <a:blip r:embed="rId3" cstate="print"/>
           <a:srcRect/>
           <a:stretch>
             <a:fillRect/>
@@ -3405,19 +4952,53 @@
         </p:blipFill>
         <p:spPr bwMode="auto">
           <a:xfrm>
-            <a:off x="683568" y="1052736"/>
-            <a:ext cx="7822679" cy="5137088"/>
+            <a:off x="979200" y="816566"/>
+            <a:ext cx="7380000" cy="4964201"/>
           </a:xfrm>
           <a:prstGeom prst="rect">
             <a:avLst/>
           </a:prstGeom>
           <a:noFill/>
-          <a:ln w="9525">
+          <a:ln w="9525" cap="flat">
             <a:noFill/>
-            <a:miter lim="800000"/>
+            <a:round/>
             <a:headEnd/>
             <a:tailEnd/>
           </a:ln>
+          <a:effectLst/>
+        </p:spPr>
+      </p:pic>
+      <p:pic>
+        <p:nvPicPr>
+          <p:cNvPr id="10243" name="Picture 3"/>
+          <p:cNvPicPr>
+            <a:picLocks noChangeAspect="1" noChangeArrowheads="1"/>
+          </p:cNvPicPr>
+          <p:nvPr/>
+        </p:nvPicPr>
+        <p:blipFill>
+          <a:blip r:embed="rId4" cstate="print"/>
+          <a:srcRect/>
+          <a:stretch>
+            <a:fillRect/>
+          </a:stretch>
+        </p:blipFill>
+        <p:spPr bwMode="auto">
+          <a:xfrm>
+            <a:off x="979200" y="718637"/>
+            <a:ext cx="7362720" cy="146895"/>
+          </a:xfrm>
+          <a:prstGeom prst="rect">
+            <a:avLst/>
+          </a:prstGeom>
+          <a:noFill/>
+          <a:ln w="9525" cap="flat">
+            <a:noFill/>
+            <a:round/>
+            <a:headEnd/>
+            <a:tailEnd/>
+          </a:ln>
+          <a:effectLst/>
         </p:spPr>
       </p:pic>
     </p:spTree>
@@ -3425,10 +5006,38 @@
   <p:clrMapOvr>
     <a:masterClrMapping/>
   </p:clrMapOvr>
+  <p:transition spd="med"/>
+  <p:timing>
+    <p:tnLst>
+      <p:par>
+        <p:cTn id="1" dur="indefinite" nodeType="tmRoot">
+          <p:childTnLst>
+            <p:seq concurrent="1" nextAc="seek">
+              <p:cTn id="2" dur="0" nodeType="mainSeq"/>
+              <p:prevCondLst>
+                <p:cond evt="onPrev" delay="0">
+                  <p:tgtEl>
+                    <p:sldTgt/>
+                  </p:tgtEl>
+                </p:cond>
+              </p:prevCondLst>
+              <p:nextCondLst>
+                <p:cond evt="onNext" delay="0">
+                  <p:tgtEl>
+                    <p:sldTgt/>
+                  </p:tgtEl>
+                </p:cond>
+              </p:nextCondLst>
+            </p:seq>
+          </p:childTnLst>
+        </p:cTn>
+      </p:par>
+    </p:tnLst>
+  </p:timing>
 </p:sld>
 </file>
 
-<file path=ppt/slides/slide4.xml><?xml version="1.0" encoding="utf-8"?>
+<file path=ppt/slides/slide12.xml><?xml version="1.0" encoding="utf-8"?>
 <p:sld xmlns:a="http://schemas.openxmlformats.org/drawingml/2006/main" xmlns:r="http://schemas.openxmlformats.org/officeDocument/2006/relationships" xmlns:p="http://schemas.openxmlformats.org/presentationml/2006/main">
   <p:cSld>
     <p:spTree>
@@ -3455,88 +5064,6 @@
             <p:ph type="title"/>
           </p:nvPr>
         </p:nvSpPr>
-        <p:spPr/>
-        <p:txBody>
-          <a:bodyPr/>
-          <a:lstStyle/>
-          <a:p>
-            <a:r>
-              <a:rPr lang="en-US" altLang="ko-KR" dirty="0" smtClean="0"/>
-              <a:t>3.Animation Character</a:t>
-            </a:r>
-            <a:endParaRPr lang="ko-KR" altLang="en-US" dirty="0"/>
-          </a:p>
-        </p:txBody>
-      </p:sp>
-      <p:pic>
-        <p:nvPicPr>
-          <p:cNvPr id="5122" name="Picture 2"/>
-          <p:cNvPicPr>
-            <a:picLocks noGrp="1" noChangeAspect="1" noChangeArrowheads="1"/>
-          </p:cNvPicPr>
-          <p:nvPr>
-            <p:ph idx="1"/>
-          </p:nvPr>
-        </p:nvPicPr>
-        <p:blipFill>
-          <a:blip r:embed="rId2" cstate="print"/>
-          <a:srcRect/>
-          <a:stretch>
-            <a:fillRect/>
-          </a:stretch>
-        </p:blipFill>
-        <p:spPr bwMode="auto">
-          <a:xfrm>
-            <a:off x="395536" y="1268760"/>
-            <a:ext cx="8316563" cy="4929411"/>
-          </a:xfrm>
-          <a:prstGeom prst="rect">
-            <a:avLst/>
-          </a:prstGeom>
-          <a:noFill/>
-          <a:ln w="9525">
-            <a:noFill/>
-            <a:miter lim="800000"/>
-            <a:headEnd/>
-            <a:tailEnd/>
-          </a:ln>
-        </p:spPr>
-      </p:pic>
-    </p:spTree>
-  </p:cSld>
-  <p:clrMapOvr>
-    <a:masterClrMapping/>
-  </p:clrMapOvr>
-</p:sld>
-</file>
-
-<file path=ppt/slides/slide5.xml><?xml version="1.0" encoding="utf-8"?>
-<p:sld xmlns:a="http://schemas.openxmlformats.org/drawingml/2006/main" xmlns:r="http://schemas.openxmlformats.org/officeDocument/2006/relationships" xmlns:p="http://schemas.openxmlformats.org/presentationml/2006/main">
-  <p:cSld>
-    <p:spTree>
-      <p:nvGrpSpPr>
-        <p:cNvPr id="1" name=""/>
-        <p:cNvGrpSpPr/>
-        <p:nvPr/>
-      </p:nvGrpSpPr>
-      <p:grpSpPr>
-        <a:xfrm>
-          <a:off x="0" y="0"/>
-          <a:ext cx="0" cy="0"/>
-          <a:chOff x="0" y="0"/>
-          <a:chExt cx="0" cy="0"/>
-        </a:xfrm>
-      </p:grpSpPr>
-      <p:sp>
-        <p:nvSpPr>
-          <p:cNvPr id="2" name="제목 1"/>
-          <p:cNvSpPr>
-            <a:spLocks noGrp="1"/>
-          </p:cNvSpPr>
-          <p:nvPr>
-            <p:ph type="title"/>
-          </p:nvPr>
-        </p:nvSpPr>
         <p:spPr>
           <a:xfrm>
             <a:off x="467544" y="0"/>
@@ -3589,7 +5116,7 @@
 </p:sld>
 </file>
 
-<file path=ppt/slides/slide6.xml><?xml version="1.0" encoding="utf-8"?>
+<file path=ppt/slides/slide13.xml><?xml version="1.0" encoding="utf-8"?>
 <p:sld xmlns:a="http://schemas.openxmlformats.org/drawingml/2006/main" xmlns:r="http://schemas.openxmlformats.org/officeDocument/2006/relationships" xmlns:p="http://schemas.openxmlformats.org/presentationml/2006/main">
   <p:cSld>
     <p:spTree>
@@ -3761,7 +5288,7 @@
 </p:sld>
 </file>
 
-<file path=ppt/slides/slide7.xml><?xml version="1.0" encoding="utf-8"?>
+<file path=ppt/slides/slide14.xml><?xml version="1.0" encoding="utf-8"?>
 <p:sld xmlns:a="http://schemas.openxmlformats.org/drawingml/2006/main" xmlns:r="http://schemas.openxmlformats.org/officeDocument/2006/relationships" xmlns:p="http://schemas.openxmlformats.org/presentationml/2006/main">
   <p:cSld>
     <p:spTree>
@@ -3933,7 +5460,7 @@
 </p:sld>
 </file>
 
-<file path=ppt/slides/slide8.xml><?xml version="1.0" encoding="utf-8"?>
+<file path=ppt/slides/slide15.xml><?xml version="1.0" encoding="utf-8"?>
 <p:sld xmlns:a="http://schemas.openxmlformats.org/drawingml/2006/main" xmlns:r="http://schemas.openxmlformats.org/officeDocument/2006/relationships" xmlns:p="http://schemas.openxmlformats.org/presentationml/2006/main">
   <p:cSld>
     <p:spTree>
@@ -5340,6 +6867,1530 @@
   <p:clrMapOvr>
     <a:masterClrMapping/>
   </p:clrMapOvr>
+</p:sld>
+</file>
+
+<file path=ppt/slides/slide2.xml><?xml version="1.0" encoding="utf-8"?>
+<p:sld xmlns:a="http://schemas.openxmlformats.org/drawingml/2006/main" xmlns:r="http://schemas.openxmlformats.org/officeDocument/2006/relationships" xmlns:p="http://schemas.openxmlformats.org/presentationml/2006/main">
+  <p:cSld>
+    <p:spTree>
+      <p:nvGrpSpPr>
+        <p:cNvPr id="1" name=""/>
+        <p:cNvGrpSpPr/>
+        <p:nvPr/>
+      </p:nvGrpSpPr>
+      <p:grpSpPr>
+        <a:xfrm>
+          <a:off x="0" y="0"/>
+          <a:ext cx="0" cy="0"/>
+          <a:chOff x="0" y="0"/>
+          <a:chExt cx="0" cy="0"/>
+        </a:xfrm>
+      </p:grpSpPr>
+      <p:sp>
+        <p:nvSpPr>
+          <p:cNvPr id="2" name="제목 1"/>
+          <p:cNvSpPr>
+            <a:spLocks noGrp="1"/>
+          </p:cNvSpPr>
+          <p:nvPr>
+            <p:ph type="title"/>
+          </p:nvPr>
+        </p:nvSpPr>
+        <p:spPr>
+          <a:xfrm>
+            <a:off x="467544" y="0"/>
+            <a:ext cx="8229600" cy="1143000"/>
+          </a:xfrm>
+        </p:spPr>
+        <p:txBody>
+          <a:bodyPr/>
+          <a:lstStyle/>
+          <a:p>
+            <a:r>
+              <a:rPr lang="en-US" altLang="ko-KR" dirty="0" smtClean="0"/>
+              <a:t>1. Sound</a:t>
+            </a:r>
+            <a:endParaRPr lang="ko-KR" altLang="en-US" dirty="0"/>
+          </a:p>
+        </p:txBody>
+      </p:sp>
+      <p:pic>
+        <p:nvPicPr>
+          <p:cNvPr id="2050" name="Picture 2"/>
+          <p:cNvPicPr>
+            <a:picLocks noGrp="1" noChangeAspect="1" noChangeArrowheads="1"/>
+          </p:cNvPicPr>
+          <p:nvPr>
+            <p:ph idx="1"/>
+          </p:nvPr>
+        </p:nvPicPr>
+        <p:blipFill>
+          <a:blip r:embed="rId2" cstate="print"/>
+          <a:srcRect/>
+          <a:stretch>
+            <a:fillRect/>
+          </a:stretch>
+        </p:blipFill>
+        <p:spPr bwMode="auto">
+          <a:xfrm>
+            <a:off x="81699" y="980728"/>
+            <a:ext cx="8954797" cy="5145435"/>
+          </a:xfrm>
+          <a:prstGeom prst="rect">
+            <a:avLst/>
+          </a:prstGeom>
+          <a:noFill/>
+          <a:ln w="9525">
+            <a:noFill/>
+            <a:miter lim="800000"/>
+            <a:headEnd/>
+            <a:tailEnd/>
+          </a:ln>
+        </p:spPr>
+      </p:pic>
+    </p:spTree>
+  </p:cSld>
+  <p:clrMapOvr>
+    <a:masterClrMapping/>
+  </p:clrMapOvr>
+</p:sld>
+</file>
+
+<file path=ppt/slides/slide3.xml><?xml version="1.0" encoding="utf-8"?>
+<p:sld xmlns:a="http://schemas.openxmlformats.org/drawingml/2006/main" xmlns:r="http://schemas.openxmlformats.org/officeDocument/2006/relationships" xmlns:p="http://schemas.openxmlformats.org/presentationml/2006/main">
+  <p:cSld>
+    <p:spTree>
+      <p:nvGrpSpPr>
+        <p:cNvPr id="1" name=""/>
+        <p:cNvGrpSpPr/>
+        <p:nvPr/>
+      </p:nvGrpSpPr>
+      <p:grpSpPr>
+        <a:xfrm>
+          <a:off x="0" y="0"/>
+          <a:ext cx="0" cy="0"/>
+          <a:chOff x="0" y="0"/>
+          <a:chExt cx="0" cy="0"/>
+        </a:xfrm>
+      </p:grpSpPr>
+      <p:sp>
+        <p:nvSpPr>
+          <p:cNvPr id="2" name="제목 1"/>
+          <p:cNvSpPr>
+            <a:spLocks noGrp="1"/>
+          </p:cNvSpPr>
+          <p:nvPr>
+            <p:ph type="title"/>
+          </p:nvPr>
+        </p:nvSpPr>
+        <p:spPr>
+          <a:xfrm>
+            <a:off x="467544" y="0"/>
+            <a:ext cx="8229600" cy="1143000"/>
+          </a:xfrm>
+        </p:spPr>
+        <p:txBody>
+          <a:bodyPr/>
+          <a:lstStyle/>
+          <a:p>
+            <a:r>
+              <a:rPr lang="en-US" altLang="ko-KR" dirty="0" smtClean="0"/>
+              <a:t>2.Character</a:t>
+            </a:r>
+            <a:endParaRPr lang="ko-KR" altLang="en-US" dirty="0"/>
+          </a:p>
+        </p:txBody>
+      </p:sp>
+      <p:pic>
+        <p:nvPicPr>
+          <p:cNvPr id="3" name="Picture 2"/>
+          <p:cNvPicPr>
+            <a:picLocks noChangeAspect="1" noChangeArrowheads="1"/>
+          </p:cNvPicPr>
+          <p:nvPr/>
+        </p:nvPicPr>
+        <p:blipFill>
+          <a:blip r:embed="rId2" cstate="print"/>
+          <a:srcRect/>
+          <a:stretch>
+            <a:fillRect/>
+          </a:stretch>
+        </p:blipFill>
+        <p:spPr bwMode="auto">
+          <a:xfrm>
+            <a:off x="683568" y="1052736"/>
+            <a:ext cx="7822679" cy="5137088"/>
+          </a:xfrm>
+          <a:prstGeom prst="rect">
+            <a:avLst/>
+          </a:prstGeom>
+          <a:noFill/>
+          <a:ln w="9525">
+            <a:noFill/>
+            <a:miter lim="800000"/>
+            <a:headEnd/>
+            <a:tailEnd/>
+          </a:ln>
+        </p:spPr>
+      </p:pic>
+      <p:pic>
+        <p:nvPicPr>
+          <p:cNvPr id="4" name="Picture 3"/>
+          <p:cNvPicPr>
+            <a:picLocks noChangeAspect="1" noChangeArrowheads="1"/>
+          </p:cNvPicPr>
+          <p:nvPr/>
+        </p:nvPicPr>
+        <p:blipFill>
+          <a:blip r:embed="rId3" cstate="print"/>
+          <a:srcRect/>
+          <a:stretch>
+            <a:fillRect/>
+          </a:stretch>
+        </p:blipFill>
+        <p:spPr bwMode="auto">
+          <a:xfrm>
+            <a:off x="696853" y="4539461"/>
+            <a:ext cx="792088" cy="1617455"/>
+          </a:xfrm>
+          <a:prstGeom prst="rect">
+            <a:avLst/>
+          </a:prstGeom>
+          <a:noFill/>
+          <a:ln w="9525" cap="flat">
+            <a:noFill/>
+            <a:round/>
+            <a:headEnd/>
+            <a:tailEnd/>
+          </a:ln>
+          <a:effectLst/>
+        </p:spPr>
+      </p:pic>
+      <p:sp>
+        <p:nvSpPr>
+          <p:cNvPr id="6" name="직사각형 5"/>
+          <p:cNvSpPr/>
+          <p:nvPr/>
+        </p:nvSpPr>
+        <p:spPr>
+          <a:xfrm>
+            <a:off x="1581220" y="5220811"/>
+            <a:ext cx="338554" cy="276999"/>
+          </a:xfrm>
+          <a:prstGeom prst="rect">
+            <a:avLst/>
+          </a:prstGeom>
+          <a:solidFill>
+            <a:schemeClr val="bg1"/>
+          </a:solidFill>
+        </p:spPr>
+        <p:txBody>
+          <a:bodyPr wrap="none">
+            <a:spAutoFit/>
+          </a:bodyPr>
+          <a:lstStyle/>
+          <a:p>
+            <a:r>
+              <a:rPr lang="ko-KR" altLang="en-US" sz="1200" dirty="0" smtClean="0"/>
+              <a:t>남</a:t>
+            </a:r>
+            <a:endParaRPr lang="ko-KR" altLang="en-US" sz="1200" dirty="0"/>
+          </a:p>
+        </p:txBody>
+      </p:sp>
+    </p:spTree>
+  </p:cSld>
+  <p:clrMapOvr>
+    <a:masterClrMapping/>
+  </p:clrMapOvr>
+</p:sld>
+</file>
+
+<file path=ppt/slides/slide4.xml><?xml version="1.0" encoding="utf-8"?>
+<p:sld xmlns:a="http://schemas.openxmlformats.org/drawingml/2006/main" xmlns:r="http://schemas.openxmlformats.org/officeDocument/2006/relationships" xmlns:p="http://schemas.openxmlformats.org/presentationml/2006/main">
+  <p:cSld>
+    <p:spTree>
+      <p:nvGrpSpPr>
+        <p:cNvPr id="1" name=""/>
+        <p:cNvGrpSpPr/>
+        <p:nvPr/>
+      </p:nvGrpSpPr>
+      <p:grpSpPr>
+        <a:xfrm>
+          <a:off x="0" y="0"/>
+          <a:ext cx="0" cy="0"/>
+          <a:chOff x="0" y="0"/>
+          <a:chExt cx="0" cy="0"/>
+        </a:xfrm>
+      </p:grpSpPr>
+      <p:sp>
+        <p:nvSpPr>
+          <p:cNvPr id="3073" name="Rectangle 1"/>
+          <p:cNvSpPr>
+            <a:spLocks noGrp="1" noChangeArrowheads="1"/>
+          </p:cNvSpPr>
+          <p:nvPr>
+            <p:ph type="title"/>
+          </p:nvPr>
+        </p:nvSpPr>
+        <p:spPr>
+          <a:xfrm>
+            <a:off x="457920" y="131054"/>
+            <a:ext cx="8228160" cy="653829"/>
+          </a:xfrm>
+          <a:ln/>
+        </p:spPr>
+        <p:txBody>
+          <a:bodyPr tIns="20116">
+            <a:normAutofit fontScale="90000"/>
+          </a:bodyPr>
+          <a:lstStyle/>
+          <a:p>
+            <a:pPr>
+              <a:tabLst>
+                <a:tab pos="656650" algn="l"/>
+                <a:tab pos="1313299" algn="l"/>
+                <a:tab pos="1969949" algn="l"/>
+                <a:tab pos="2626599" algn="l"/>
+                <a:tab pos="3283248" algn="l"/>
+                <a:tab pos="3939898" algn="l"/>
+                <a:tab pos="4596548" algn="l"/>
+                <a:tab pos="5253198" algn="l"/>
+                <a:tab pos="5909847" algn="l"/>
+                <a:tab pos="6566497" algn="l"/>
+                <a:tab pos="7223147" algn="l"/>
+                <a:tab pos="7879796" algn="l"/>
+              </a:tabLst>
+            </a:pPr>
+            <a:r>
+              <a:rPr lang="en-US" dirty="0"/>
+              <a:t>3. Character Animation (Tom)</a:t>
+            </a:r>
+          </a:p>
+        </p:txBody>
+      </p:sp>
+      <p:pic>
+        <p:nvPicPr>
+          <p:cNvPr id="3074" name="Picture 2"/>
+          <p:cNvPicPr>
+            <a:picLocks noChangeAspect="1" noChangeArrowheads="1"/>
+          </p:cNvPicPr>
+          <p:nvPr/>
+        </p:nvPicPr>
+        <p:blipFill>
+          <a:blip r:embed="rId3" cstate="print"/>
+          <a:srcRect/>
+          <a:stretch>
+            <a:fillRect/>
+          </a:stretch>
+        </p:blipFill>
+        <p:spPr bwMode="auto">
+          <a:xfrm>
+            <a:off x="783360" y="783442"/>
+            <a:ext cx="7721280" cy="5687158"/>
+          </a:xfrm>
+          <a:prstGeom prst="rect">
+            <a:avLst/>
+          </a:prstGeom>
+          <a:noFill/>
+          <a:ln w="9525" cap="flat">
+            <a:noFill/>
+            <a:round/>
+            <a:headEnd/>
+            <a:tailEnd/>
+          </a:ln>
+          <a:effectLst/>
+        </p:spPr>
+      </p:pic>
+    </p:spTree>
+  </p:cSld>
+  <p:clrMapOvr>
+    <a:masterClrMapping/>
+  </p:clrMapOvr>
+  <p:transition spd="med"/>
+  <p:timing>
+    <p:tnLst>
+      <p:par>
+        <p:cTn id="1" dur="indefinite" nodeType="tmRoot">
+          <p:childTnLst>
+            <p:seq concurrent="1" nextAc="seek">
+              <p:cTn id="2" dur="0" nodeType="mainSeq"/>
+              <p:prevCondLst>
+                <p:cond evt="onPrev" delay="0">
+                  <p:tgtEl>
+                    <p:sldTgt/>
+                  </p:tgtEl>
+                </p:cond>
+              </p:prevCondLst>
+              <p:nextCondLst>
+                <p:cond evt="onNext" delay="0">
+                  <p:tgtEl>
+                    <p:sldTgt/>
+                  </p:tgtEl>
+                </p:cond>
+              </p:nextCondLst>
+            </p:seq>
+          </p:childTnLst>
+        </p:cTn>
+      </p:par>
+    </p:tnLst>
+  </p:timing>
+</p:sld>
+</file>
+
+<file path=ppt/slides/slide5.xml><?xml version="1.0" encoding="utf-8"?>
+<p:sld xmlns:a="http://schemas.openxmlformats.org/drawingml/2006/main" xmlns:r="http://schemas.openxmlformats.org/officeDocument/2006/relationships" xmlns:p="http://schemas.openxmlformats.org/presentationml/2006/main">
+  <p:cSld>
+    <p:spTree>
+      <p:nvGrpSpPr>
+        <p:cNvPr id="1" name=""/>
+        <p:cNvGrpSpPr/>
+        <p:nvPr/>
+      </p:nvGrpSpPr>
+      <p:grpSpPr>
+        <a:xfrm>
+          <a:off x="0" y="0"/>
+          <a:ext cx="0" cy="0"/>
+          <a:chOff x="0" y="0"/>
+          <a:chExt cx="0" cy="0"/>
+        </a:xfrm>
+      </p:grpSpPr>
+      <p:sp>
+        <p:nvSpPr>
+          <p:cNvPr id="4097" name="Rectangle 1"/>
+          <p:cNvSpPr>
+            <a:spLocks noGrp="1" noChangeArrowheads="1"/>
+          </p:cNvSpPr>
+          <p:nvPr>
+            <p:ph type="title"/>
+          </p:nvPr>
+        </p:nvSpPr>
+        <p:spPr>
+          <a:xfrm>
+            <a:off x="457920" y="131054"/>
+            <a:ext cx="8228160" cy="653829"/>
+          </a:xfrm>
+          <a:ln/>
+        </p:spPr>
+        <p:txBody>
+          <a:bodyPr tIns="20116">
+            <a:normAutofit fontScale="90000"/>
+          </a:bodyPr>
+          <a:lstStyle/>
+          <a:p>
+            <a:pPr>
+              <a:tabLst>
+                <a:tab pos="656650" algn="l"/>
+                <a:tab pos="1313299" algn="l"/>
+                <a:tab pos="1969949" algn="l"/>
+                <a:tab pos="2626599" algn="l"/>
+                <a:tab pos="3283248" algn="l"/>
+                <a:tab pos="3939898" algn="l"/>
+                <a:tab pos="4596548" algn="l"/>
+                <a:tab pos="5253198" algn="l"/>
+                <a:tab pos="5909847" algn="l"/>
+                <a:tab pos="6566497" algn="l"/>
+                <a:tab pos="7223147" algn="l"/>
+                <a:tab pos="7879796" algn="l"/>
+              </a:tabLst>
+            </a:pPr>
+            <a:r>
+              <a:rPr lang="en-US" dirty="0"/>
+              <a:t>3. Character Animation (Tom)</a:t>
+            </a:r>
+          </a:p>
+        </p:txBody>
+      </p:sp>
+      <p:pic>
+        <p:nvPicPr>
+          <p:cNvPr id="4098" name="Picture 2"/>
+          <p:cNvPicPr>
+            <a:picLocks noChangeAspect="1" noChangeArrowheads="1"/>
+          </p:cNvPicPr>
+          <p:nvPr/>
+        </p:nvPicPr>
+        <p:blipFill>
+          <a:blip r:embed="rId3" cstate="print"/>
+          <a:srcRect/>
+          <a:stretch>
+            <a:fillRect/>
+          </a:stretch>
+        </p:blipFill>
+        <p:spPr bwMode="auto">
+          <a:xfrm>
+            <a:off x="931681" y="1012427"/>
+            <a:ext cx="7362720" cy="5616590"/>
+          </a:xfrm>
+          <a:prstGeom prst="rect">
+            <a:avLst/>
+          </a:prstGeom>
+          <a:noFill/>
+          <a:ln w="9525" cap="flat">
+            <a:noFill/>
+            <a:round/>
+            <a:headEnd/>
+            <a:tailEnd/>
+          </a:ln>
+          <a:effectLst/>
+        </p:spPr>
+      </p:pic>
+      <p:pic>
+        <p:nvPicPr>
+          <p:cNvPr id="4099" name="Picture 3"/>
+          <p:cNvPicPr>
+            <a:picLocks noChangeAspect="1" noChangeArrowheads="1"/>
+          </p:cNvPicPr>
+          <p:nvPr/>
+        </p:nvPicPr>
+        <p:blipFill>
+          <a:blip r:embed="rId4" cstate="print"/>
+          <a:srcRect/>
+          <a:stretch>
+            <a:fillRect/>
+          </a:stretch>
+        </p:blipFill>
+        <p:spPr bwMode="auto">
+          <a:xfrm>
+            <a:off x="931681" y="914497"/>
+            <a:ext cx="7362720" cy="146895"/>
+          </a:xfrm>
+          <a:prstGeom prst="rect">
+            <a:avLst/>
+          </a:prstGeom>
+          <a:noFill/>
+          <a:ln w="9525" cap="flat">
+            <a:noFill/>
+            <a:round/>
+            <a:headEnd/>
+            <a:tailEnd/>
+          </a:ln>
+          <a:effectLst/>
+        </p:spPr>
+      </p:pic>
+    </p:spTree>
+  </p:cSld>
+  <p:clrMapOvr>
+    <a:masterClrMapping/>
+  </p:clrMapOvr>
+  <p:transition spd="med"/>
+  <p:timing>
+    <p:tnLst>
+      <p:par>
+        <p:cTn id="1" dur="indefinite" nodeType="tmRoot">
+          <p:childTnLst>
+            <p:seq concurrent="1" nextAc="seek">
+              <p:cTn id="2" dur="0" nodeType="mainSeq"/>
+              <p:prevCondLst>
+                <p:cond evt="onPrev" delay="0">
+                  <p:tgtEl>
+                    <p:sldTgt/>
+                  </p:tgtEl>
+                </p:cond>
+              </p:prevCondLst>
+              <p:nextCondLst>
+                <p:cond evt="onNext" delay="0">
+                  <p:tgtEl>
+                    <p:sldTgt/>
+                  </p:tgtEl>
+                </p:cond>
+              </p:nextCondLst>
+            </p:seq>
+          </p:childTnLst>
+        </p:cTn>
+      </p:par>
+    </p:tnLst>
+  </p:timing>
+</p:sld>
+</file>
+
+<file path=ppt/slides/slide6.xml><?xml version="1.0" encoding="utf-8"?>
+<p:sld xmlns:a="http://schemas.openxmlformats.org/drawingml/2006/main" xmlns:r="http://schemas.openxmlformats.org/officeDocument/2006/relationships" xmlns:p="http://schemas.openxmlformats.org/presentationml/2006/main">
+  <p:cSld>
+    <p:spTree>
+      <p:nvGrpSpPr>
+        <p:cNvPr id="1" name=""/>
+        <p:cNvGrpSpPr/>
+        <p:nvPr/>
+      </p:nvGrpSpPr>
+      <p:grpSpPr>
+        <a:xfrm>
+          <a:off x="0" y="0"/>
+          <a:ext cx="0" cy="0"/>
+          <a:chOff x="0" y="0"/>
+          <a:chExt cx="0" cy="0"/>
+        </a:xfrm>
+      </p:grpSpPr>
+      <p:sp>
+        <p:nvSpPr>
+          <p:cNvPr id="5121" name="Rectangle 1"/>
+          <p:cNvSpPr>
+            <a:spLocks noGrp="1" noChangeArrowheads="1"/>
+          </p:cNvSpPr>
+          <p:nvPr>
+            <p:ph type="title"/>
+          </p:nvPr>
+        </p:nvSpPr>
+        <p:spPr>
+          <a:xfrm>
+            <a:off x="457920" y="131054"/>
+            <a:ext cx="8228160" cy="653829"/>
+          </a:xfrm>
+          <a:ln/>
+        </p:spPr>
+        <p:txBody>
+          <a:bodyPr tIns="20116">
+            <a:normAutofit fontScale="90000"/>
+          </a:bodyPr>
+          <a:lstStyle/>
+          <a:p>
+            <a:pPr>
+              <a:tabLst>
+                <a:tab pos="656650" algn="l"/>
+                <a:tab pos="1313299" algn="l"/>
+                <a:tab pos="1969949" algn="l"/>
+                <a:tab pos="2626599" algn="l"/>
+                <a:tab pos="3283248" algn="l"/>
+                <a:tab pos="3939898" algn="l"/>
+                <a:tab pos="4596548" algn="l"/>
+                <a:tab pos="5253198" algn="l"/>
+                <a:tab pos="5909847" algn="l"/>
+                <a:tab pos="6566497" algn="l"/>
+                <a:tab pos="7223147" algn="l"/>
+                <a:tab pos="7879796" algn="l"/>
+              </a:tabLst>
+            </a:pPr>
+            <a:r>
+              <a:rPr lang="en-US" dirty="0"/>
+              <a:t>3. Character Animation (Tom)</a:t>
+            </a:r>
+          </a:p>
+        </p:txBody>
+      </p:sp>
+      <p:pic>
+        <p:nvPicPr>
+          <p:cNvPr id="5122" name="Picture 2"/>
+          <p:cNvPicPr>
+            <a:picLocks noChangeAspect="1" noChangeArrowheads="1"/>
+          </p:cNvPicPr>
+          <p:nvPr/>
+        </p:nvPicPr>
+        <p:blipFill>
+          <a:blip r:embed="rId3" cstate="print"/>
+          <a:srcRect/>
+          <a:stretch>
+            <a:fillRect/>
+          </a:stretch>
+        </p:blipFill>
+        <p:spPr bwMode="auto">
+          <a:xfrm>
+            <a:off x="979200" y="794964"/>
+            <a:ext cx="7356960" cy="5737562"/>
+          </a:xfrm>
+          <a:prstGeom prst="rect">
+            <a:avLst/>
+          </a:prstGeom>
+          <a:noFill/>
+          <a:ln w="9525" cap="flat">
+            <a:noFill/>
+            <a:round/>
+            <a:headEnd/>
+            <a:tailEnd/>
+          </a:ln>
+          <a:effectLst/>
+        </p:spPr>
+      </p:pic>
+      <p:pic>
+        <p:nvPicPr>
+          <p:cNvPr id="5123" name="Picture 3"/>
+          <p:cNvPicPr>
+            <a:picLocks noChangeAspect="1" noChangeArrowheads="1"/>
+          </p:cNvPicPr>
+          <p:nvPr/>
+        </p:nvPicPr>
+        <p:blipFill>
+          <a:blip r:embed="rId4" cstate="print"/>
+          <a:srcRect/>
+          <a:stretch>
+            <a:fillRect/>
+          </a:stretch>
+        </p:blipFill>
+        <p:spPr bwMode="auto">
+          <a:xfrm>
+            <a:off x="979200" y="718637"/>
+            <a:ext cx="7362720" cy="146895"/>
+          </a:xfrm>
+          <a:prstGeom prst="rect">
+            <a:avLst/>
+          </a:prstGeom>
+          <a:noFill/>
+          <a:ln w="9525" cap="flat">
+            <a:noFill/>
+            <a:round/>
+            <a:headEnd/>
+            <a:tailEnd/>
+          </a:ln>
+          <a:effectLst/>
+        </p:spPr>
+      </p:pic>
+    </p:spTree>
+  </p:cSld>
+  <p:clrMapOvr>
+    <a:masterClrMapping/>
+  </p:clrMapOvr>
+  <p:transition spd="med"/>
+  <p:timing>
+    <p:tnLst>
+      <p:par>
+        <p:cTn id="1" dur="indefinite" nodeType="tmRoot">
+          <p:childTnLst>
+            <p:seq concurrent="1" nextAc="seek">
+              <p:cTn id="2" dur="0" nodeType="mainSeq"/>
+              <p:prevCondLst>
+                <p:cond evt="onPrev" delay="0">
+                  <p:tgtEl>
+                    <p:sldTgt/>
+                  </p:tgtEl>
+                </p:cond>
+              </p:prevCondLst>
+              <p:nextCondLst>
+                <p:cond evt="onNext" delay="0">
+                  <p:tgtEl>
+                    <p:sldTgt/>
+                  </p:tgtEl>
+                </p:cond>
+              </p:nextCondLst>
+            </p:seq>
+          </p:childTnLst>
+        </p:cTn>
+      </p:par>
+    </p:tnLst>
+  </p:timing>
+</p:sld>
+</file>
+
+<file path=ppt/slides/slide7.xml><?xml version="1.0" encoding="utf-8"?>
+<p:sld xmlns:a="http://schemas.openxmlformats.org/drawingml/2006/main" xmlns:r="http://schemas.openxmlformats.org/officeDocument/2006/relationships" xmlns:p="http://schemas.openxmlformats.org/presentationml/2006/main">
+  <p:cSld>
+    <p:spTree>
+      <p:nvGrpSpPr>
+        <p:cNvPr id="1" name=""/>
+        <p:cNvGrpSpPr/>
+        <p:nvPr/>
+      </p:nvGrpSpPr>
+      <p:grpSpPr>
+        <a:xfrm>
+          <a:off x="0" y="0"/>
+          <a:ext cx="0" cy="0"/>
+          <a:chOff x="0" y="0"/>
+          <a:chExt cx="0" cy="0"/>
+        </a:xfrm>
+      </p:grpSpPr>
+      <p:sp>
+        <p:nvSpPr>
+          <p:cNvPr id="6145" name="Rectangle 1"/>
+          <p:cNvSpPr>
+            <a:spLocks noGrp="1" noChangeArrowheads="1"/>
+          </p:cNvSpPr>
+          <p:nvPr>
+            <p:ph type="title"/>
+          </p:nvPr>
+        </p:nvSpPr>
+        <p:spPr>
+          <a:xfrm>
+            <a:off x="457920" y="96491"/>
+            <a:ext cx="8228160" cy="622145"/>
+          </a:xfrm>
+          <a:ln/>
+        </p:spPr>
+        <p:txBody>
+          <a:bodyPr tIns="20116">
+            <a:normAutofit fontScale="90000"/>
+          </a:bodyPr>
+          <a:lstStyle/>
+          <a:p>
+            <a:pPr>
+              <a:tabLst>
+                <a:tab pos="656650" algn="l"/>
+                <a:tab pos="1313299" algn="l"/>
+                <a:tab pos="1969949" algn="l"/>
+                <a:tab pos="2626599" algn="l"/>
+                <a:tab pos="3283248" algn="l"/>
+                <a:tab pos="3939898" algn="l"/>
+                <a:tab pos="4596548" algn="l"/>
+                <a:tab pos="5253198" algn="l"/>
+                <a:tab pos="5909847" algn="l"/>
+                <a:tab pos="6566497" algn="l"/>
+                <a:tab pos="7223147" algn="l"/>
+                <a:tab pos="7879796" algn="l"/>
+              </a:tabLst>
+            </a:pPr>
+            <a:r>
+              <a:rPr lang="en-US" dirty="0"/>
+              <a:t>3. Character Animation (Jake)</a:t>
+            </a:r>
+          </a:p>
+        </p:txBody>
+      </p:sp>
+      <p:pic>
+        <p:nvPicPr>
+          <p:cNvPr id="6146" name="Picture 2"/>
+          <p:cNvPicPr>
+            <a:picLocks noChangeAspect="1" noChangeArrowheads="1"/>
+          </p:cNvPicPr>
+          <p:nvPr/>
+        </p:nvPicPr>
+        <p:blipFill>
+          <a:blip r:embed="rId3" cstate="print"/>
+          <a:srcRect/>
+          <a:stretch>
+            <a:fillRect/>
+          </a:stretch>
+        </p:blipFill>
+        <p:spPr bwMode="auto">
+          <a:xfrm>
+            <a:off x="1045441" y="712875"/>
+            <a:ext cx="7054560" cy="5818211"/>
+          </a:xfrm>
+          <a:prstGeom prst="rect">
+            <a:avLst/>
+          </a:prstGeom>
+          <a:noFill/>
+          <a:ln w="9525" cap="flat">
+            <a:noFill/>
+            <a:round/>
+            <a:headEnd/>
+            <a:tailEnd/>
+          </a:ln>
+          <a:effectLst/>
+        </p:spPr>
+      </p:pic>
+      <p:pic>
+        <p:nvPicPr>
+          <p:cNvPr id="6147" name="Picture 3"/>
+          <p:cNvPicPr>
+            <a:picLocks noChangeAspect="1" noChangeArrowheads="1"/>
+          </p:cNvPicPr>
+          <p:nvPr/>
+        </p:nvPicPr>
+        <p:blipFill>
+          <a:blip r:embed="rId4" cstate="print"/>
+          <a:srcRect/>
+          <a:stretch>
+            <a:fillRect/>
+          </a:stretch>
+        </p:blipFill>
+        <p:spPr bwMode="auto">
+          <a:xfrm>
+            <a:off x="1064161" y="849690"/>
+            <a:ext cx="895680" cy="1828992"/>
+          </a:xfrm>
+          <a:prstGeom prst="rect">
+            <a:avLst/>
+          </a:prstGeom>
+          <a:noFill/>
+          <a:ln w="9525" cap="flat">
+            <a:noFill/>
+            <a:round/>
+            <a:headEnd/>
+            <a:tailEnd/>
+          </a:ln>
+          <a:effectLst/>
+        </p:spPr>
+      </p:pic>
+      <p:pic>
+        <p:nvPicPr>
+          <p:cNvPr id="6148" name="Picture 4"/>
+          <p:cNvPicPr>
+            <a:picLocks noChangeAspect="1" noChangeArrowheads="1"/>
+          </p:cNvPicPr>
+          <p:nvPr/>
+        </p:nvPicPr>
+        <p:blipFill>
+          <a:blip r:embed="rId5" cstate="print"/>
+          <a:srcRect/>
+          <a:stretch>
+            <a:fillRect/>
+          </a:stretch>
+        </p:blipFill>
+        <p:spPr bwMode="auto">
+          <a:xfrm>
+            <a:off x="1088640" y="2736288"/>
+            <a:ext cx="869760" cy="1836193"/>
+          </a:xfrm>
+          <a:prstGeom prst="rect">
+            <a:avLst/>
+          </a:prstGeom>
+          <a:noFill/>
+          <a:ln w="9525" cap="flat">
+            <a:noFill/>
+            <a:round/>
+            <a:headEnd/>
+            <a:tailEnd/>
+          </a:ln>
+          <a:effectLst/>
+        </p:spPr>
+      </p:pic>
+      <p:pic>
+        <p:nvPicPr>
+          <p:cNvPr id="6149" name="Picture 5"/>
+          <p:cNvPicPr>
+            <a:picLocks noChangeAspect="1" noChangeArrowheads="1"/>
+          </p:cNvPicPr>
+          <p:nvPr/>
+        </p:nvPicPr>
+        <p:blipFill>
+          <a:blip r:embed="rId6" cstate="print"/>
+          <a:srcRect/>
+          <a:stretch>
+            <a:fillRect/>
+          </a:stretch>
+        </p:blipFill>
+        <p:spPr bwMode="auto">
+          <a:xfrm>
+            <a:off x="1071360" y="4637287"/>
+            <a:ext cx="823680" cy="1828992"/>
+          </a:xfrm>
+          <a:prstGeom prst="rect">
+            <a:avLst/>
+          </a:prstGeom>
+          <a:noFill/>
+          <a:ln w="9525" cap="flat">
+            <a:noFill/>
+            <a:round/>
+            <a:headEnd/>
+            <a:tailEnd/>
+          </a:ln>
+          <a:effectLst/>
+        </p:spPr>
+      </p:pic>
+    </p:spTree>
+  </p:cSld>
+  <p:clrMapOvr>
+    <a:masterClrMapping/>
+  </p:clrMapOvr>
+  <p:transition spd="med"/>
+  <p:timing>
+    <p:tnLst>
+      <p:par>
+        <p:cTn id="1" dur="indefinite" nodeType="tmRoot">
+          <p:childTnLst>
+            <p:seq concurrent="1" nextAc="seek">
+              <p:cTn id="2" dur="0" nodeType="mainSeq"/>
+              <p:prevCondLst>
+                <p:cond evt="onPrev" delay="0">
+                  <p:tgtEl>
+                    <p:sldTgt/>
+                  </p:tgtEl>
+                </p:cond>
+              </p:prevCondLst>
+              <p:nextCondLst>
+                <p:cond evt="onNext" delay="0">
+                  <p:tgtEl>
+                    <p:sldTgt/>
+                  </p:tgtEl>
+                </p:cond>
+              </p:nextCondLst>
+            </p:seq>
+          </p:childTnLst>
+        </p:cTn>
+      </p:par>
+    </p:tnLst>
+  </p:timing>
+</p:sld>
+</file>
+
+<file path=ppt/slides/slide8.xml><?xml version="1.0" encoding="utf-8"?>
+<p:sld xmlns:a="http://schemas.openxmlformats.org/drawingml/2006/main" xmlns:r="http://schemas.openxmlformats.org/officeDocument/2006/relationships" xmlns:p="http://schemas.openxmlformats.org/presentationml/2006/main">
+  <p:cSld>
+    <p:spTree>
+      <p:nvGrpSpPr>
+        <p:cNvPr id="1" name=""/>
+        <p:cNvGrpSpPr/>
+        <p:nvPr/>
+      </p:nvGrpSpPr>
+      <p:grpSpPr>
+        <a:xfrm>
+          <a:off x="0" y="0"/>
+          <a:ext cx="0" cy="0"/>
+          <a:chOff x="0" y="0"/>
+          <a:chExt cx="0" cy="0"/>
+        </a:xfrm>
+      </p:grpSpPr>
+      <p:sp>
+        <p:nvSpPr>
+          <p:cNvPr id="7169" name="Rectangle 1"/>
+          <p:cNvSpPr>
+            <a:spLocks noGrp="1" noChangeArrowheads="1"/>
+          </p:cNvSpPr>
+          <p:nvPr>
+            <p:ph type="title"/>
+          </p:nvPr>
+        </p:nvSpPr>
+        <p:spPr>
+          <a:xfrm>
+            <a:off x="457920" y="96491"/>
+            <a:ext cx="8228160" cy="622145"/>
+          </a:xfrm>
+          <a:ln/>
+        </p:spPr>
+        <p:txBody>
+          <a:bodyPr tIns="20116">
+            <a:normAutofit fontScale="90000"/>
+          </a:bodyPr>
+          <a:lstStyle/>
+          <a:p>
+            <a:pPr>
+              <a:tabLst>
+                <a:tab pos="656650" algn="l"/>
+                <a:tab pos="1313299" algn="l"/>
+                <a:tab pos="1969949" algn="l"/>
+                <a:tab pos="2626599" algn="l"/>
+                <a:tab pos="3283248" algn="l"/>
+                <a:tab pos="3939898" algn="l"/>
+                <a:tab pos="4596548" algn="l"/>
+                <a:tab pos="5253198" algn="l"/>
+                <a:tab pos="5909847" algn="l"/>
+                <a:tab pos="6566497" algn="l"/>
+                <a:tab pos="7223147" algn="l"/>
+                <a:tab pos="7879796" algn="l"/>
+              </a:tabLst>
+            </a:pPr>
+            <a:r>
+              <a:rPr lang="en-US" dirty="0"/>
+              <a:t>3. Character Animation (Jake)</a:t>
+            </a:r>
+          </a:p>
+        </p:txBody>
+      </p:sp>
+      <p:pic>
+        <p:nvPicPr>
+          <p:cNvPr id="7170" name="Picture 2"/>
+          <p:cNvPicPr>
+            <a:picLocks noChangeAspect="1" noChangeArrowheads="1"/>
+          </p:cNvPicPr>
+          <p:nvPr/>
+        </p:nvPicPr>
+        <p:blipFill>
+          <a:blip r:embed="rId3" cstate="print"/>
+          <a:srcRect/>
+          <a:stretch>
+            <a:fillRect/>
+          </a:stretch>
+        </p:blipFill>
+        <p:spPr bwMode="auto">
+          <a:xfrm>
+            <a:off x="961921" y="816567"/>
+            <a:ext cx="7348320" cy="5291115"/>
+          </a:xfrm>
+          <a:prstGeom prst="rect">
+            <a:avLst/>
+          </a:prstGeom>
+          <a:noFill/>
+          <a:ln w="9525" cap="flat">
+            <a:noFill/>
+            <a:round/>
+            <a:headEnd/>
+            <a:tailEnd/>
+          </a:ln>
+          <a:effectLst/>
+        </p:spPr>
+      </p:pic>
+      <p:pic>
+        <p:nvPicPr>
+          <p:cNvPr id="7171" name="Picture 3"/>
+          <p:cNvPicPr>
+            <a:picLocks noChangeAspect="1" noChangeArrowheads="1"/>
+          </p:cNvPicPr>
+          <p:nvPr/>
+        </p:nvPicPr>
+        <p:blipFill>
+          <a:blip r:embed="rId4" cstate="print"/>
+          <a:srcRect/>
+          <a:stretch>
+            <a:fillRect/>
+          </a:stretch>
+        </p:blipFill>
+        <p:spPr bwMode="auto">
+          <a:xfrm>
+            <a:off x="979200" y="718637"/>
+            <a:ext cx="7362720" cy="146895"/>
+          </a:xfrm>
+          <a:prstGeom prst="rect">
+            <a:avLst/>
+          </a:prstGeom>
+          <a:noFill/>
+          <a:ln w="9525" cap="flat">
+            <a:noFill/>
+            <a:round/>
+            <a:headEnd/>
+            <a:tailEnd/>
+          </a:ln>
+          <a:effectLst/>
+        </p:spPr>
+      </p:pic>
+      <p:pic>
+        <p:nvPicPr>
+          <p:cNvPr id="7172" name="Picture 4"/>
+          <p:cNvPicPr>
+            <a:picLocks noChangeAspect="1" noChangeArrowheads="1"/>
+          </p:cNvPicPr>
+          <p:nvPr/>
+        </p:nvPicPr>
+        <p:blipFill>
+          <a:blip r:embed="rId5" cstate="print"/>
+          <a:srcRect/>
+          <a:stretch>
+            <a:fillRect/>
+          </a:stretch>
+        </p:blipFill>
+        <p:spPr bwMode="auto">
+          <a:xfrm>
+            <a:off x="1045440" y="864091"/>
+            <a:ext cx="869760" cy="1683537"/>
+          </a:xfrm>
+          <a:prstGeom prst="rect">
+            <a:avLst/>
+          </a:prstGeom>
+          <a:noFill/>
+          <a:ln w="9525" cap="flat">
+            <a:noFill/>
+            <a:round/>
+            <a:headEnd/>
+            <a:tailEnd/>
+          </a:ln>
+          <a:effectLst/>
+        </p:spPr>
+      </p:pic>
+      <p:pic>
+        <p:nvPicPr>
+          <p:cNvPr id="7173" name="Picture 5"/>
+          <p:cNvPicPr>
+            <a:picLocks noChangeAspect="1" noChangeArrowheads="1"/>
+          </p:cNvPicPr>
+          <p:nvPr/>
+        </p:nvPicPr>
+        <p:blipFill>
+          <a:blip r:embed="rId6" cstate="print"/>
+          <a:srcRect/>
+          <a:stretch>
+            <a:fillRect/>
+          </a:stretch>
+        </p:blipFill>
+        <p:spPr bwMode="auto">
+          <a:xfrm>
+            <a:off x="1045440" y="2612435"/>
+            <a:ext cx="823680" cy="1697939"/>
+          </a:xfrm>
+          <a:prstGeom prst="rect">
+            <a:avLst/>
+          </a:prstGeom>
+          <a:noFill/>
+          <a:ln w="9525" cap="flat">
+            <a:noFill/>
+            <a:round/>
+            <a:headEnd/>
+            <a:tailEnd/>
+          </a:ln>
+          <a:effectLst/>
+        </p:spPr>
+      </p:pic>
+      <p:pic>
+        <p:nvPicPr>
+          <p:cNvPr id="7174" name="Picture 6"/>
+          <p:cNvPicPr>
+            <a:picLocks noChangeAspect="1" noChangeArrowheads="1"/>
+          </p:cNvPicPr>
+          <p:nvPr/>
+        </p:nvPicPr>
+        <p:blipFill>
+          <a:blip r:embed="rId7" cstate="print"/>
+          <a:srcRect/>
+          <a:stretch>
+            <a:fillRect/>
+          </a:stretch>
+        </p:blipFill>
+        <p:spPr bwMode="auto">
+          <a:xfrm>
+            <a:off x="1032481" y="4389581"/>
+            <a:ext cx="861120" cy="1684977"/>
+          </a:xfrm>
+          <a:prstGeom prst="rect">
+            <a:avLst/>
+          </a:prstGeom>
+          <a:noFill/>
+          <a:ln w="9525" cap="flat">
+            <a:noFill/>
+            <a:round/>
+            <a:headEnd/>
+            <a:tailEnd/>
+          </a:ln>
+          <a:effectLst/>
+        </p:spPr>
+      </p:pic>
+    </p:spTree>
+  </p:cSld>
+  <p:clrMapOvr>
+    <a:masterClrMapping/>
+  </p:clrMapOvr>
+  <p:transition spd="med"/>
+  <p:timing>
+    <p:tnLst>
+      <p:par>
+        <p:cTn id="1" dur="indefinite" nodeType="tmRoot">
+          <p:childTnLst>
+            <p:seq concurrent="1" nextAc="seek">
+              <p:cTn id="2" dur="0" nodeType="mainSeq"/>
+              <p:prevCondLst>
+                <p:cond evt="onPrev" delay="0">
+                  <p:tgtEl>
+                    <p:sldTgt/>
+                  </p:tgtEl>
+                </p:cond>
+              </p:prevCondLst>
+              <p:nextCondLst>
+                <p:cond evt="onNext" delay="0">
+                  <p:tgtEl>
+                    <p:sldTgt/>
+                  </p:tgtEl>
+                </p:cond>
+              </p:nextCondLst>
+            </p:seq>
+          </p:childTnLst>
+        </p:cTn>
+      </p:par>
+    </p:tnLst>
+  </p:timing>
+</p:sld>
+</file>
+
+<file path=ppt/slides/slide9.xml><?xml version="1.0" encoding="utf-8"?>
+<p:sld xmlns:a="http://schemas.openxmlformats.org/drawingml/2006/main" xmlns:r="http://schemas.openxmlformats.org/officeDocument/2006/relationships" xmlns:p="http://schemas.openxmlformats.org/presentationml/2006/main">
+  <p:cSld>
+    <p:spTree>
+      <p:nvGrpSpPr>
+        <p:cNvPr id="1" name=""/>
+        <p:cNvGrpSpPr/>
+        <p:nvPr/>
+      </p:nvGrpSpPr>
+      <p:grpSpPr>
+        <a:xfrm>
+          <a:off x="0" y="0"/>
+          <a:ext cx="0" cy="0"/>
+          <a:chOff x="0" y="0"/>
+          <a:chExt cx="0" cy="0"/>
+        </a:xfrm>
+      </p:grpSpPr>
+      <p:sp>
+        <p:nvSpPr>
+          <p:cNvPr id="8193" name="Rectangle 1"/>
+          <p:cNvSpPr>
+            <a:spLocks noGrp="1" noChangeArrowheads="1"/>
+          </p:cNvSpPr>
+          <p:nvPr>
+            <p:ph type="title"/>
+          </p:nvPr>
+        </p:nvSpPr>
+        <p:spPr>
+          <a:xfrm>
+            <a:off x="457920" y="96491"/>
+            <a:ext cx="8228160" cy="622145"/>
+          </a:xfrm>
+          <a:ln/>
+        </p:spPr>
+        <p:txBody>
+          <a:bodyPr tIns="20116">
+            <a:normAutofit fontScale="90000"/>
+          </a:bodyPr>
+          <a:lstStyle/>
+          <a:p>
+            <a:pPr>
+              <a:tabLst>
+                <a:tab pos="656650" algn="l"/>
+                <a:tab pos="1313299" algn="l"/>
+                <a:tab pos="1969949" algn="l"/>
+                <a:tab pos="2626599" algn="l"/>
+                <a:tab pos="3283248" algn="l"/>
+                <a:tab pos="3939898" algn="l"/>
+                <a:tab pos="4596548" algn="l"/>
+                <a:tab pos="5253198" algn="l"/>
+                <a:tab pos="5909847" algn="l"/>
+                <a:tab pos="6566497" algn="l"/>
+                <a:tab pos="7223147" algn="l"/>
+                <a:tab pos="7879796" algn="l"/>
+              </a:tabLst>
+            </a:pPr>
+            <a:r>
+              <a:rPr lang="en-US" dirty="0"/>
+              <a:t>3. Character Animation (Jake)</a:t>
+            </a:r>
+          </a:p>
+        </p:txBody>
+      </p:sp>
+      <p:pic>
+        <p:nvPicPr>
+          <p:cNvPr id="8194" name="Picture 2"/>
+          <p:cNvPicPr>
+            <a:picLocks noChangeAspect="1" noChangeArrowheads="1"/>
+          </p:cNvPicPr>
+          <p:nvPr/>
+        </p:nvPicPr>
+        <p:blipFill>
+          <a:blip r:embed="rId3" cstate="print"/>
+          <a:srcRect/>
+          <a:stretch>
+            <a:fillRect/>
+          </a:stretch>
+        </p:blipFill>
+        <p:spPr bwMode="auto">
+          <a:xfrm>
+            <a:off x="982080" y="812245"/>
+            <a:ext cx="7345440" cy="5818211"/>
+          </a:xfrm>
+          <a:prstGeom prst="rect">
+            <a:avLst/>
+          </a:prstGeom>
+          <a:noFill/>
+          <a:ln w="9525" cap="flat">
+            <a:noFill/>
+            <a:round/>
+            <a:headEnd/>
+            <a:tailEnd/>
+          </a:ln>
+          <a:effectLst/>
+        </p:spPr>
+      </p:pic>
+      <p:pic>
+        <p:nvPicPr>
+          <p:cNvPr id="8195" name="Picture 3"/>
+          <p:cNvPicPr>
+            <a:picLocks noChangeAspect="1" noChangeArrowheads="1"/>
+          </p:cNvPicPr>
+          <p:nvPr/>
+        </p:nvPicPr>
+        <p:blipFill>
+          <a:blip r:embed="rId4" cstate="print"/>
+          <a:srcRect/>
+          <a:stretch>
+            <a:fillRect/>
+          </a:stretch>
+        </p:blipFill>
+        <p:spPr bwMode="auto">
+          <a:xfrm>
+            <a:off x="979200" y="718637"/>
+            <a:ext cx="7362720" cy="146895"/>
+          </a:xfrm>
+          <a:prstGeom prst="rect">
+            <a:avLst/>
+          </a:prstGeom>
+          <a:noFill/>
+          <a:ln w="9525" cap="flat">
+            <a:noFill/>
+            <a:round/>
+            <a:headEnd/>
+            <a:tailEnd/>
+          </a:ln>
+          <a:effectLst/>
+        </p:spPr>
+      </p:pic>
+      <p:pic>
+        <p:nvPicPr>
+          <p:cNvPr id="8196" name="Picture 4"/>
+          <p:cNvPicPr>
+            <a:picLocks noChangeAspect="1" noChangeArrowheads="1"/>
+          </p:cNvPicPr>
+          <p:nvPr/>
+        </p:nvPicPr>
+        <p:blipFill>
+          <a:blip r:embed="rId5" cstate="print"/>
+          <a:srcRect/>
+          <a:stretch>
+            <a:fillRect/>
+          </a:stretch>
+        </p:blipFill>
+        <p:spPr bwMode="auto">
+          <a:xfrm>
+            <a:off x="1045440" y="864091"/>
+            <a:ext cx="848160" cy="1617290"/>
+          </a:xfrm>
+          <a:prstGeom prst="rect">
+            <a:avLst/>
+          </a:prstGeom>
+          <a:noFill/>
+          <a:ln w="9525" cap="flat">
+            <a:noFill/>
+            <a:round/>
+            <a:headEnd/>
+            <a:tailEnd/>
+          </a:ln>
+          <a:effectLst/>
+        </p:spPr>
+      </p:pic>
+      <p:pic>
+        <p:nvPicPr>
+          <p:cNvPr id="8197" name="Picture 5"/>
+          <p:cNvPicPr>
+            <a:picLocks noChangeAspect="1" noChangeArrowheads="1"/>
+          </p:cNvPicPr>
+          <p:nvPr/>
+        </p:nvPicPr>
+        <p:blipFill>
+          <a:blip r:embed="rId6" cstate="print"/>
+          <a:srcRect/>
+          <a:stretch>
+            <a:fillRect/>
+          </a:stretch>
+        </p:blipFill>
+        <p:spPr bwMode="auto">
+          <a:xfrm>
+            <a:off x="1013760" y="2547628"/>
+            <a:ext cx="881280" cy="1502077"/>
+          </a:xfrm>
+          <a:prstGeom prst="rect">
+            <a:avLst/>
+          </a:prstGeom>
+          <a:noFill/>
+          <a:ln w="9525" cap="flat">
+            <a:noFill/>
+            <a:round/>
+            <a:headEnd/>
+            <a:tailEnd/>
+          </a:ln>
+          <a:effectLst/>
+        </p:spPr>
+      </p:pic>
+      <p:pic>
+        <p:nvPicPr>
+          <p:cNvPr id="8198" name="Picture 6"/>
+          <p:cNvPicPr>
+            <a:picLocks noChangeAspect="1" noChangeArrowheads="1"/>
+          </p:cNvPicPr>
+          <p:nvPr/>
+        </p:nvPicPr>
+        <p:blipFill>
+          <a:blip r:embed="rId7" cstate="print"/>
+          <a:srcRect/>
+          <a:stretch>
+            <a:fillRect/>
+          </a:stretch>
+        </p:blipFill>
+        <p:spPr bwMode="auto">
+          <a:xfrm>
+            <a:off x="1013760" y="4088589"/>
+            <a:ext cx="881280" cy="419084"/>
+          </a:xfrm>
+          <a:prstGeom prst="rect">
+            <a:avLst/>
+          </a:prstGeom>
+          <a:noFill/>
+          <a:ln w="9525" cap="flat">
+            <a:noFill/>
+            <a:round/>
+            <a:headEnd/>
+            <a:tailEnd/>
+          </a:ln>
+          <a:effectLst/>
+        </p:spPr>
+      </p:pic>
+      <p:pic>
+        <p:nvPicPr>
+          <p:cNvPr id="8199" name="Picture 7"/>
+          <p:cNvPicPr>
+            <a:picLocks noChangeAspect="1" noChangeArrowheads="1"/>
+          </p:cNvPicPr>
+          <p:nvPr/>
+        </p:nvPicPr>
+        <p:blipFill>
+          <a:blip r:embed="rId8" cstate="print"/>
+          <a:srcRect/>
+          <a:stretch>
+            <a:fillRect/>
+          </a:stretch>
+        </p:blipFill>
+        <p:spPr bwMode="auto">
+          <a:xfrm>
+            <a:off x="1012321" y="4586882"/>
+            <a:ext cx="930240" cy="450767"/>
+          </a:xfrm>
+          <a:prstGeom prst="rect">
+            <a:avLst/>
+          </a:prstGeom>
+          <a:noFill/>
+          <a:ln w="9525" cap="flat">
+            <a:noFill/>
+            <a:round/>
+            <a:headEnd/>
+            <a:tailEnd/>
+          </a:ln>
+          <a:effectLst/>
+        </p:spPr>
+      </p:pic>
+      <p:pic>
+        <p:nvPicPr>
+          <p:cNvPr id="8200" name="Picture 8"/>
+          <p:cNvPicPr>
+            <a:picLocks noChangeAspect="1" noChangeArrowheads="1"/>
+          </p:cNvPicPr>
+          <p:nvPr/>
+        </p:nvPicPr>
+        <p:blipFill>
+          <a:blip r:embed="rId9" cstate="print"/>
+          <a:srcRect/>
+          <a:stretch>
+            <a:fillRect/>
+          </a:stretch>
+        </p:blipFill>
+        <p:spPr bwMode="auto">
+          <a:xfrm>
+            <a:off x="1032481" y="5090935"/>
+            <a:ext cx="861120" cy="1506398"/>
+          </a:xfrm>
+          <a:prstGeom prst="rect">
+            <a:avLst/>
+          </a:prstGeom>
+          <a:noFill/>
+          <a:ln w="9525" cap="flat">
+            <a:noFill/>
+            <a:round/>
+            <a:headEnd/>
+            <a:tailEnd/>
+          </a:ln>
+          <a:effectLst/>
+        </p:spPr>
+      </p:pic>
+    </p:spTree>
+  </p:cSld>
+  <p:clrMapOvr>
+    <a:masterClrMapping/>
+  </p:clrMapOvr>
+  <p:transition spd="med"/>
+  <p:timing>
+    <p:tnLst>
+      <p:par>
+        <p:cTn id="1" dur="indefinite" nodeType="tmRoot">
+          <p:childTnLst>
+            <p:seq concurrent="1" nextAc="seek">
+              <p:cTn id="2" dur="0" nodeType="mainSeq"/>
+              <p:prevCondLst>
+                <p:cond evt="onPrev" delay="0">
+                  <p:tgtEl>
+                    <p:sldTgt/>
+                  </p:tgtEl>
+                </p:cond>
+              </p:prevCondLst>
+              <p:nextCondLst>
+                <p:cond evt="onNext" delay="0">
+                  <p:tgtEl>
+                    <p:sldTgt/>
+                  </p:tgtEl>
+                </p:cond>
+              </p:nextCondLst>
+            </p:seq>
+          </p:childTnLst>
+        </p:cTn>
+      </p:par>
+    </p:tnLst>
+  </p:timing>
 </p:sld>
 </file>
 
@@ -5624,4 +8675,287 @@
   <a:objectDefaults/>
   <a:extraClrSchemeLst/>
 </a:theme>
+</file>
+
+<file path=ppt/theme/theme2.xml><?xml version="1.0" encoding="utf-8"?>
+<a:theme xmlns:a="http://schemas.openxmlformats.org/drawingml/2006/main" name="Office 테마">
+  <a:themeElements>
+    <a:clrScheme name="Office">
+      <a:dk1>
+        <a:sysClr val="windowText" lastClr="000000"/>
+      </a:dk1>
+      <a:lt1>
+        <a:sysClr val="window" lastClr="FFFFFF"/>
+      </a:lt1>
+      <a:dk2>
+        <a:srgbClr val="1F497D"/>
+      </a:dk2>
+      <a:lt2>
+        <a:srgbClr val="EEECE1"/>
+      </a:lt2>
+      <a:accent1>
+        <a:srgbClr val="4F81BD"/>
+      </a:accent1>
+      <a:accent2>
+        <a:srgbClr val="C0504D"/>
+      </a:accent2>
+      <a:accent3>
+        <a:srgbClr val="9BBB59"/>
+      </a:accent3>
+      <a:accent4>
+        <a:srgbClr val="8064A2"/>
+      </a:accent4>
+      <a:accent5>
+        <a:srgbClr val="4BACC6"/>
+      </a:accent5>
+      <a:accent6>
+        <a:srgbClr val="F79646"/>
+      </a:accent6>
+      <a:hlink>
+        <a:srgbClr val="0000FF"/>
+      </a:hlink>
+      <a:folHlink>
+        <a:srgbClr val="800080"/>
+      </a:folHlink>
+    </a:clrScheme>
+    <a:fontScheme name="Office">
+      <a:majorFont>
+        <a:latin typeface="맑은 고딕"/>
+        <a:ea typeface=""/>
+        <a:cs typeface=""/>
+        <a:font script="Jpan" typeface="ＭＳ Ｐゴシック"/>
+        <a:font script="Hang" typeface="맑은 고딕"/>
+        <a:font script="Hans" typeface="宋体"/>
+        <a:font script="Hant" typeface="新細明體"/>
+        <a:font script="Arab" typeface="Times New Roman"/>
+        <a:font script="Hebr" typeface="Times New Roman"/>
+        <a:font script="Thai" typeface="Angsana New"/>
+        <a:font script="Ethi" typeface="Nyala"/>
+        <a:font script="Beng" typeface="Vrinda"/>
+        <a:font script="Gujr" typeface="Shruti"/>
+        <a:font script="Khmr" typeface="MoolBoran"/>
+        <a:font script="Knda" typeface="Tunga"/>
+        <a:font script="Guru" typeface="Raavi"/>
+        <a:font script="Cans" typeface="Euphemia"/>
+        <a:font script="Cher" typeface="Plantagenet Cherokee"/>
+        <a:font script="Yiii" typeface="Microsoft Yi Baiti"/>
+        <a:font script="Tibt" typeface="Microsoft Himalaya"/>
+        <a:font script="Thaa" typeface="MV Boli"/>
+        <a:font script="Deva" typeface="Mangal"/>
+        <a:font script="Telu" typeface="Gautami"/>
+        <a:font script="Taml" typeface="Latha"/>
+        <a:font script="Syrc" typeface="Estrangelo Edessa"/>
+        <a:font script="Orya" typeface="Kalinga"/>
+        <a:font script="Mlym" typeface="Kartika"/>
+        <a:font script="Laoo" typeface="DokChampa"/>
+        <a:font script="Sinh" typeface="Iskoola Pota"/>
+        <a:font script="Mong" typeface="Mongolian Baiti"/>
+        <a:font script="Viet" typeface="Times New Roman"/>
+        <a:font script="Uigh" typeface="Microsoft Uighur"/>
+      </a:majorFont>
+      <a:minorFont>
+        <a:latin typeface="맑은 고딕"/>
+        <a:ea typeface=""/>
+        <a:cs typeface=""/>
+        <a:font script="Jpan" typeface="ＭＳ Ｐゴシック"/>
+        <a:font script="Hang" typeface="맑은 고딕"/>
+        <a:font script="Hans" typeface="宋体"/>
+        <a:font script="Hant" typeface="新細明體"/>
+        <a:font script="Arab" typeface="Arial"/>
+        <a:font script="Hebr" typeface="Arial"/>
+        <a:font script="Thai" typeface="Cordia New"/>
+        <a:font script="Ethi" typeface="Nyala"/>
+        <a:font script="Beng" typeface="Vrinda"/>
+        <a:font script="Gujr" typeface="Shruti"/>
+        <a:font script="Khmr" typeface="DaunPenh"/>
+        <a:font script="Knda" typeface="Tunga"/>
+        <a:font script="Guru" typeface="Raavi"/>
+        <a:font script="Cans" typeface="Euphemia"/>
+        <a:font script="Cher" typeface="Plantagenet Cherokee"/>
+        <a:font script="Yiii" typeface="Microsoft Yi Baiti"/>
+        <a:font script="Tibt" typeface="Microsoft Himalaya"/>
+        <a:font script="Thaa" typeface="MV Boli"/>
+        <a:font script="Deva" typeface="Mangal"/>
+        <a:font script="Telu" typeface="Gautami"/>
+        <a:font script="Taml" typeface="Latha"/>
+        <a:font script="Syrc" typeface="Estrangelo Edessa"/>
+        <a:font script="Orya" typeface="Kalinga"/>
+        <a:font script="Mlym" typeface="Kartika"/>
+        <a:font script="Laoo" typeface="DokChampa"/>
+        <a:font script="Sinh" typeface="Iskoola Pota"/>
+        <a:font script="Mong" typeface="Mongolian Baiti"/>
+        <a:font script="Viet" typeface="Arial"/>
+        <a:font script="Uigh" typeface="Microsoft Uighur"/>
+      </a:minorFont>
+    </a:fontScheme>
+    <a:fmtScheme name="Office">
+      <a:fillStyleLst>
+        <a:solidFill>
+          <a:schemeClr val="phClr"/>
+        </a:solidFill>
+        <a:gradFill rotWithShape="1">
+          <a:gsLst>
+            <a:gs pos="0">
+              <a:schemeClr val="phClr">
+                <a:tint val="50000"/>
+                <a:satMod val="300000"/>
+              </a:schemeClr>
+            </a:gs>
+            <a:gs pos="35000">
+              <a:schemeClr val="phClr">
+                <a:tint val="37000"/>
+                <a:satMod val="300000"/>
+              </a:schemeClr>
+            </a:gs>
+            <a:gs pos="100000">
+              <a:schemeClr val="phClr">
+                <a:tint val="15000"/>
+                <a:satMod val="350000"/>
+              </a:schemeClr>
+            </a:gs>
+          </a:gsLst>
+          <a:lin ang="16200000" scaled="1"/>
+        </a:gradFill>
+        <a:gradFill rotWithShape="1">
+          <a:gsLst>
+            <a:gs pos="0">
+              <a:schemeClr val="phClr">
+                <a:shade val="51000"/>
+                <a:satMod val="130000"/>
+              </a:schemeClr>
+            </a:gs>
+            <a:gs pos="80000">
+              <a:schemeClr val="phClr">
+                <a:shade val="93000"/>
+                <a:satMod val="130000"/>
+              </a:schemeClr>
+            </a:gs>
+            <a:gs pos="100000">
+              <a:schemeClr val="phClr">
+                <a:shade val="94000"/>
+                <a:satMod val="135000"/>
+              </a:schemeClr>
+            </a:gs>
+          </a:gsLst>
+          <a:lin ang="16200000" scaled="0"/>
+        </a:gradFill>
+      </a:fillStyleLst>
+      <a:lnStyleLst>
+        <a:ln w="9525" cap="flat" cmpd="sng" algn="ctr">
+          <a:solidFill>
+            <a:schemeClr val="phClr">
+              <a:shade val="95000"/>
+              <a:satMod val="105000"/>
+            </a:schemeClr>
+          </a:solidFill>
+          <a:prstDash val="solid"/>
+        </a:ln>
+        <a:ln w="25400" cap="flat" cmpd="sng" algn="ctr">
+          <a:solidFill>
+            <a:schemeClr val="phClr"/>
+          </a:solidFill>
+          <a:prstDash val="solid"/>
+        </a:ln>
+        <a:ln w="38100" cap="flat" cmpd="sng" algn="ctr">
+          <a:solidFill>
+            <a:schemeClr val="phClr"/>
+          </a:solidFill>
+          <a:prstDash val="solid"/>
+        </a:ln>
+      </a:lnStyleLst>
+      <a:effectStyleLst>
+        <a:effectStyle>
+          <a:effectLst>
+            <a:outerShdw blurRad="40000" dist="20000" dir="5400000" rotWithShape="0">
+              <a:srgbClr val="000000">
+                <a:alpha val="38000"/>
+              </a:srgbClr>
+            </a:outerShdw>
+          </a:effectLst>
+        </a:effectStyle>
+        <a:effectStyle>
+          <a:effectLst>
+            <a:outerShdw blurRad="40000" dist="23000" dir="5400000" rotWithShape="0">
+              <a:srgbClr val="000000">
+                <a:alpha val="35000"/>
+              </a:srgbClr>
+            </a:outerShdw>
+          </a:effectLst>
+        </a:effectStyle>
+        <a:effectStyle>
+          <a:effectLst>
+            <a:outerShdw blurRad="40000" dist="23000" dir="5400000" rotWithShape="0">
+              <a:srgbClr val="000000">
+                <a:alpha val="35000"/>
+              </a:srgbClr>
+            </a:outerShdw>
+          </a:effectLst>
+          <a:scene3d>
+            <a:camera prst="orthographicFront">
+              <a:rot lat="0" lon="0" rev="0"/>
+            </a:camera>
+            <a:lightRig rig="threePt" dir="t">
+              <a:rot lat="0" lon="0" rev="1200000"/>
+            </a:lightRig>
+          </a:scene3d>
+          <a:sp3d>
+            <a:bevelT w="63500" h="25400"/>
+          </a:sp3d>
+        </a:effectStyle>
+      </a:effectStyleLst>
+      <a:bgFillStyleLst>
+        <a:solidFill>
+          <a:schemeClr val="phClr"/>
+        </a:solidFill>
+        <a:gradFill rotWithShape="1">
+          <a:gsLst>
+            <a:gs pos="0">
+              <a:schemeClr val="phClr">
+                <a:tint val="40000"/>
+                <a:satMod val="350000"/>
+              </a:schemeClr>
+            </a:gs>
+            <a:gs pos="40000">
+              <a:schemeClr val="phClr">
+                <a:tint val="45000"/>
+                <a:shade val="99000"/>
+                <a:satMod val="350000"/>
+              </a:schemeClr>
+            </a:gs>
+            <a:gs pos="100000">
+              <a:schemeClr val="phClr">
+                <a:shade val="20000"/>
+                <a:satMod val="255000"/>
+              </a:schemeClr>
+            </a:gs>
+          </a:gsLst>
+          <a:path path="circle">
+            <a:fillToRect l="50000" t="-80000" r="50000" b="180000"/>
+          </a:path>
+        </a:gradFill>
+        <a:gradFill rotWithShape="1">
+          <a:gsLst>
+            <a:gs pos="0">
+              <a:schemeClr val="phClr">
+                <a:tint val="80000"/>
+                <a:satMod val="300000"/>
+              </a:schemeClr>
+            </a:gs>
+            <a:gs pos="100000">
+              <a:schemeClr val="phClr">
+                <a:shade val="30000"/>
+                <a:satMod val="200000"/>
+              </a:schemeClr>
+            </a:gs>
+          </a:gsLst>
+          <a:path path="circle">
+            <a:fillToRect l="50000" t="50000" r="50000" b="50000"/>
+          </a:path>
+        </a:gradFill>
+      </a:bgFillStyleLst>
+    </a:fmtScheme>
+  </a:themeElements>
+  <a:objectDefaults/>
+  <a:extraClrSchemeLst/>
+</a:theme>
 </file>
</xml_diff>